<commit_message>
Updated part 2 ppt. Tried to fix index
</commit_message>
<xml_diff>
--- a/02_Intro_Meta-analysis_2021-07-06.pptx
+++ b/02_Intro_Meta-analysis_2021-07-06.pptx
@@ -5,7 +5,7 @@
     <p:sldMasterId id="2147483648" r:id="rId1"/>
   </p:sldMasterIdLst>
   <p:notesMasterIdLst>
-    <p:notesMasterId r:id="rId50"/>
+    <p:notesMasterId r:id="rId51"/>
   </p:notesMasterIdLst>
   <p:sldIdLst>
     <p:sldId id="256" r:id="rId2"/>
@@ -46,16 +46,17 @@
     <p:sldId id="410" r:id="rId37"/>
     <p:sldId id="391" r:id="rId38"/>
     <p:sldId id="400" r:id="rId39"/>
-    <p:sldId id="287" r:id="rId40"/>
-    <p:sldId id="386" r:id="rId41"/>
-    <p:sldId id="388" r:id="rId42"/>
-    <p:sldId id="393" r:id="rId43"/>
-    <p:sldId id="322" r:id="rId44"/>
-    <p:sldId id="310" r:id="rId45"/>
-    <p:sldId id="397" r:id="rId46"/>
-    <p:sldId id="396" r:id="rId47"/>
-    <p:sldId id="398" r:id="rId48"/>
-    <p:sldId id="377" r:id="rId49"/>
+    <p:sldId id="411" r:id="rId40"/>
+    <p:sldId id="287" r:id="rId41"/>
+    <p:sldId id="386" r:id="rId42"/>
+    <p:sldId id="388" r:id="rId43"/>
+    <p:sldId id="393" r:id="rId44"/>
+    <p:sldId id="322" r:id="rId45"/>
+    <p:sldId id="310" r:id="rId46"/>
+    <p:sldId id="397" r:id="rId47"/>
+    <p:sldId id="396" r:id="rId48"/>
+    <p:sldId id="398" r:id="rId49"/>
+    <p:sldId id="377" r:id="rId50"/>
   </p:sldIdLst>
   <p:sldSz cx="12192000" cy="6858000"/>
   <p:notesSz cx="6858000" cy="9144000"/>
@@ -660,7 +661,7 @@
           <a:p>
             <a:fld id="{700E2BA0-6B8B-7A40-9298-7B14ED4552A5}" type="slidenum">
               <a:rPr lang="en-US" smtClean="0"/>
-              <a:t>27</a:t>
+              <a:t>26</a:t>
             </a:fld>
             <a:endParaRPr lang="en-US" dirty="0"/>
           </a:p>
@@ -669,7 +670,7 @@
     </p:spTree>
     <p:extLst>
       <p:ext uri="{BB962C8B-B14F-4D97-AF65-F5344CB8AC3E}">
-        <p14:creationId xmlns:p14="http://schemas.microsoft.com/office/powerpoint/2010/main" val="3080114206"/>
+        <p14:creationId xmlns:p14="http://schemas.microsoft.com/office/powerpoint/2010/main" val="2899290946"/>
       </p:ext>
     </p:extLst>
   </p:cSld>
@@ -744,7 +745,7 @@
           <a:p>
             <a:fld id="{700E2BA0-6B8B-7A40-9298-7B14ED4552A5}" type="slidenum">
               <a:rPr lang="en-US" smtClean="0"/>
-              <a:t>28</a:t>
+              <a:t>27</a:t>
             </a:fld>
             <a:endParaRPr lang="en-US" dirty="0"/>
           </a:p>
@@ -753,7 +754,7 @@
     </p:spTree>
     <p:extLst>
       <p:ext uri="{BB962C8B-B14F-4D97-AF65-F5344CB8AC3E}">
-        <p14:creationId xmlns:p14="http://schemas.microsoft.com/office/powerpoint/2010/main" val="2044872041"/>
+        <p14:creationId xmlns:p14="http://schemas.microsoft.com/office/powerpoint/2010/main" val="3080114206"/>
       </p:ext>
     </p:extLst>
   </p:cSld>
@@ -828,7 +829,7 @@
           <a:p>
             <a:fld id="{700E2BA0-6B8B-7A40-9298-7B14ED4552A5}" type="slidenum">
               <a:rPr lang="en-US" smtClean="0"/>
-              <a:t>29</a:t>
+              <a:t>28</a:t>
             </a:fld>
             <a:endParaRPr lang="en-US" dirty="0"/>
           </a:p>
@@ -837,7 +838,7 @@
     </p:spTree>
     <p:extLst>
       <p:ext uri="{BB962C8B-B14F-4D97-AF65-F5344CB8AC3E}">
-        <p14:creationId xmlns:p14="http://schemas.microsoft.com/office/powerpoint/2010/main" val="2592311226"/>
+        <p14:creationId xmlns:p14="http://schemas.microsoft.com/office/powerpoint/2010/main" val="2044872041"/>
       </p:ext>
     </p:extLst>
   </p:cSld>
@@ -912,7 +913,7 @@
           <a:p>
             <a:fld id="{700E2BA0-6B8B-7A40-9298-7B14ED4552A5}" type="slidenum">
               <a:rPr lang="en-US" smtClean="0"/>
-              <a:t>31</a:t>
+              <a:t>29</a:t>
             </a:fld>
             <a:endParaRPr lang="en-US" dirty="0"/>
           </a:p>
@@ -921,7 +922,7 @@
     </p:spTree>
     <p:extLst>
       <p:ext uri="{BB962C8B-B14F-4D97-AF65-F5344CB8AC3E}">
-        <p14:creationId xmlns:p14="http://schemas.microsoft.com/office/powerpoint/2010/main" val="2468254401"/>
+        <p14:creationId xmlns:p14="http://schemas.microsoft.com/office/powerpoint/2010/main" val="2592311226"/>
       </p:ext>
     </p:extLst>
   </p:cSld>
@@ -996,7 +997,7 @@
           <a:p>
             <a:fld id="{700E2BA0-6B8B-7A40-9298-7B14ED4552A5}" type="slidenum">
               <a:rPr lang="en-US" smtClean="0"/>
-              <a:t>32</a:t>
+              <a:t>31</a:t>
             </a:fld>
             <a:endParaRPr lang="en-US" dirty="0"/>
           </a:p>
@@ -1005,7 +1006,7 @@
     </p:spTree>
     <p:extLst>
       <p:ext uri="{BB962C8B-B14F-4D97-AF65-F5344CB8AC3E}">
-        <p14:creationId xmlns:p14="http://schemas.microsoft.com/office/powerpoint/2010/main" val="2183780080"/>
+        <p14:creationId xmlns:p14="http://schemas.microsoft.com/office/powerpoint/2010/main" val="2468254401"/>
       </p:ext>
     </p:extLst>
   </p:cSld>
@@ -1080,7 +1081,7 @@
           <a:p>
             <a:fld id="{700E2BA0-6B8B-7A40-9298-7B14ED4552A5}" type="slidenum">
               <a:rPr lang="en-US" smtClean="0"/>
-              <a:t>33</a:t>
+              <a:t>32</a:t>
             </a:fld>
             <a:endParaRPr lang="en-US" dirty="0"/>
           </a:p>
@@ -1089,7 +1090,7 @@
     </p:spTree>
     <p:extLst>
       <p:ext uri="{BB962C8B-B14F-4D97-AF65-F5344CB8AC3E}">
-        <p14:creationId xmlns:p14="http://schemas.microsoft.com/office/powerpoint/2010/main" val="999809598"/>
+        <p14:creationId xmlns:p14="http://schemas.microsoft.com/office/powerpoint/2010/main" val="2183780080"/>
       </p:ext>
     </p:extLst>
   </p:cSld>
@@ -1164,7 +1165,7 @@
           <a:p>
             <a:fld id="{700E2BA0-6B8B-7A40-9298-7B14ED4552A5}" type="slidenum">
               <a:rPr lang="en-US" smtClean="0"/>
-              <a:t>36</a:t>
+              <a:t>33</a:t>
             </a:fld>
             <a:endParaRPr lang="en-US" dirty="0"/>
           </a:p>
@@ -1173,7 +1174,7 @@
     </p:spTree>
     <p:extLst>
       <p:ext uri="{BB962C8B-B14F-4D97-AF65-F5344CB8AC3E}">
-        <p14:creationId xmlns:p14="http://schemas.microsoft.com/office/powerpoint/2010/main" val="2262867407"/>
+        <p14:creationId xmlns:p14="http://schemas.microsoft.com/office/powerpoint/2010/main" val="999809598"/>
       </p:ext>
     </p:extLst>
   </p:cSld>
@@ -1248,7 +1249,7 @@
           <a:p>
             <a:fld id="{700E2BA0-6B8B-7A40-9298-7B14ED4552A5}" type="slidenum">
               <a:rPr lang="en-US" smtClean="0"/>
-              <a:t>39</a:t>
+              <a:t>36</a:t>
             </a:fld>
             <a:endParaRPr lang="en-US" dirty="0"/>
           </a:p>
@@ -1257,7 +1258,7 @@
     </p:spTree>
     <p:extLst>
       <p:ext uri="{BB962C8B-B14F-4D97-AF65-F5344CB8AC3E}">
-        <p14:creationId xmlns:p14="http://schemas.microsoft.com/office/powerpoint/2010/main" val="958009552"/>
+        <p14:creationId xmlns:p14="http://schemas.microsoft.com/office/powerpoint/2010/main" val="2262867407"/>
       </p:ext>
     </p:extLst>
   </p:cSld>
@@ -1332,7 +1333,7 @@
           <a:p>
             <a:fld id="{700E2BA0-6B8B-7A40-9298-7B14ED4552A5}" type="slidenum">
               <a:rPr lang="en-US" smtClean="0"/>
-              <a:t>41</a:t>
+              <a:t>40</a:t>
             </a:fld>
             <a:endParaRPr lang="en-US" dirty="0"/>
           </a:p>
@@ -1341,7 +1342,7 @@
     </p:spTree>
     <p:extLst>
       <p:ext uri="{BB962C8B-B14F-4D97-AF65-F5344CB8AC3E}">
-        <p14:creationId xmlns:p14="http://schemas.microsoft.com/office/powerpoint/2010/main" val="610728464"/>
+        <p14:creationId xmlns:p14="http://schemas.microsoft.com/office/powerpoint/2010/main" val="958009552"/>
       </p:ext>
     </p:extLst>
   </p:cSld>
@@ -1370,118 +1371,64 @@
       </p:grpSpPr>
       <p:sp>
         <p:nvSpPr>
-          <p:cNvPr id="7" name="Rectangle 7">
-            <a:extLst>
-              <a:ext uri="{FF2B5EF4-FFF2-40B4-BE49-F238E27FC236}">
-                <a16:creationId xmlns:a16="http://schemas.microsoft.com/office/drawing/2014/main" id="{01F0A50A-1EEF-D043-8490-9F626DC7F347}"/>
-              </a:ext>
-            </a:extLst>
-          </p:cNvPr>
-          <p:cNvSpPr>
-            <a:spLocks noGrp="1" noChangeArrowheads="1"/>
+          <p:cNvPr id="2" name="Slide Image Placeholder 1"/>
+          <p:cNvSpPr>
+            <a:spLocks noGrp="1" noRot="1" noChangeAspect="1"/>
+          </p:cNvSpPr>
+          <p:nvPr>
+            <p:ph type="sldImg"/>
+          </p:nvPr>
+        </p:nvSpPr>
+        <p:spPr/>
+      </p:sp>
+      <p:sp>
+        <p:nvSpPr>
+          <p:cNvPr id="3" name="Notes Placeholder 2"/>
+          <p:cNvSpPr>
+            <a:spLocks noGrp="1"/>
+          </p:cNvSpPr>
+          <p:nvPr>
+            <p:ph type="body" idx="1"/>
+          </p:nvPr>
+        </p:nvSpPr>
+        <p:spPr/>
+        <p:txBody>
+          <a:bodyPr/>
+          <a:lstStyle/>
+          <a:p>
+            <a:endParaRPr lang="en-US" dirty="0"/>
+          </a:p>
+        </p:txBody>
+      </p:sp>
+      <p:sp>
+        <p:nvSpPr>
+          <p:cNvPr id="4" name="Slide Number Placeholder 3"/>
+          <p:cNvSpPr>
+            <a:spLocks noGrp="1"/>
           </p:cNvSpPr>
           <p:nvPr>
             <p:ph type="sldNum" sz="quarter" idx="5"/>
           </p:nvPr>
         </p:nvSpPr>
-        <p:spPr>
-          <a:ln/>
-        </p:spPr>
-        <p:txBody>
-          <a:bodyPr/>
-          <a:lstStyle/>
-          <a:p>
-            <a:fld id="{09DE6CDC-0C78-884C-B7A9-8076A6825522}" type="slidenum">
-              <a:rPr lang="en-US" altLang="en-US"/>
-              <a:pPr/>
-              <a:t>43</a:t>
+        <p:spPr/>
+        <p:txBody>
+          <a:bodyPr/>
+          <a:lstStyle/>
+          <a:p>
+            <a:fld id="{700E2BA0-6B8B-7A40-9298-7B14ED4552A5}" type="slidenum">
+              <a:rPr lang="en-US" smtClean="0"/>
+              <a:t>42</a:t>
             </a:fld>
-            <a:endParaRPr lang="en-US" altLang="en-US" dirty="0"/>
-          </a:p>
-        </p:txBody>
-      </p:sp>
-      <p:sp>
-        <p:nvSpPr>
-          <p:cNvPr id="109570" name="Rectangle 2">
-            <a:extLst>
-              <a:ext uri="{FF2B5EF4-FFF2-40B4-BE49-F238E27FC236}">
-                <a16:creationId xmlns:a16="http://schemas.microsoft.com/office/drawing/2014/main" id="{60C9A799-9C5D-6645-9827-E234D732637D}"/>
-              </a:ext>
-            </a:extLst>
-          </p:cNvPr>
-          <p:cNvSpPr>
-            <a:spLocks noGrp="1" noRot="1" noChangeAspect="1" noChangeArrowheads="1"/>
-          </p:cNvSpPr>
-          <p:nvPr>
-            <p:ph type="sldImg"/>
-          </p:nvPr>
-        </p:nvSpPr>
-        <p:spPr bwMode="auto">
-          <a:xfrm>
-            <a:off x="381000" y="685800"/>
-            <a:ext cx="6096000" cy="3429000"/>
-          </a:xfrm>
-          <a:prstGeom prst="rect">
-            <a:avLst/>
-          </a:prstGeom>
-          <a:solidFill>
-            <a:srgbClr val="FFFFFF"/>
-          </a:solidFill>
-          <a:ln>
-            <a:solidFill>
-              <a:srgbClr val="000000"/>
-            </a:solidFill>
-            <a:miter lim="800000"/>
-            <a:headEnd/>
-            <a:tailEnd/>
-          </a:ln>
-        </p:spPr>
-      </p:sp>
-      <p:sp>
-        <p:nvSpPr>
-          <p:cNvPr id="109571" name="Rectangle 3">
-            <a:extLst>
-              <a:ext uri="{FF2B5EF4-FFF2-40B4-BE49-F238E27FC236}">
-                <a16:creationId xmlns:a16="http://schemas.microsoft.com/office/drawing/2014/main" id="{6C1D94F5-66AD-E744-A0DD-41083E4F0581}"/>
-              </a:ext>
-            </a:extLst>
-          </p:cNvPr>
-          <p:cNvSpPr>
-            <a:spLocks noGrp="1" noChangeArrowheads="1"/>
-          </p:cNvSpPr>
-          <p:nvPr>
-            <p:ph type="body" idx="1"/>
-          </p:nvPr>
-        </p:nvSpPr>
-        <p:spPr bwMode="auto">
-          <a:xfrm>
-            <a:off x="914400" y="4343400"/>
-            <a:ext cx="5029200" cy="4114800"/>
-          </a:xfrm>
-          <a:prstGeom prst="rect">
-            <a:avLst/>
-          </a:prstGeom>
-          <a:solidFill>
-            <a:srgbClr val="FFFFFF"/>
-          </a:solidFill>
-          <a:ln>
-            <a:solidFill>
-              <a:srgbClr val="000000"/>
-            </a:solidFill>
-            <a:miter lim="800000"/>
-            <a:headEnd/>
-            <a:tailEnd/>
-          </a:ln>
-        </p:spPr>
-        <p:txBody>
-          <a:bodyPr/>
-          <a:lstStyle/>
-          <a:p>
-            <a:endParaRPr lang="en-US" altLang="en-US" dirty="0"/>
+            <a:endParaRPr lang="en-US" dirty="0"/>
           </a:p>
         </p:txBody>
       </p:sp>
     </p:spTree>
+    <p:extLst>
+      <p:ext uri="{BB962C8B-B14F-4D97-AF65-F5344CB8AC3E}">
+        <p14:creationId xmlns:p14="http://schemas.microsoft.com/office/powerpoint/2010/main" val="610728464"/>
+      </p:ext>
+    </p:extLst>
   </p:cSld>
   <p:clrMapOvr>
     <a:masterClrMapping/>
@@ -1708,6 +1655,144 @@
         </p:txBody>
       </p:sp>
     </p:spTree>
+  </p:cSld>
+  <p:clrMapOvr>
+    <a:masterClrMapping/>
+  </p:clrMapOvr>
+</p:notes>
+</file>
+
+<file path=ppt/notesSlides/notesSlide21.xml><?xml version="1.0" encoding="utf-8"?>
+<p:notes xmlns:a="http://schemas.openxmlformats.org/drawingml/2006/main" xmlns:r="http://schemas.openxmlformats.org/officeDocument/2006/relationships" xmlns:p="http://schemas.openxmlformats.org/presentationml/2006/main">
+  <p:cSld>
+    <p:spTree>
+      <p:nvGrpSpPr>
+        <p:cNvPr id="1" name=""/>
+        <p:cNvGrpSpPr/>
+        <p:nvPr/>
+      </p:nvGrpSpPr>
+      <p:grpSpPr>
+        <a:xfrm>
+          <a:off x="0" y="0"/>
+          <a:ext cx="0" cy="0"/>
+          <a:chOff x="0" y="0"/>
+          <a:chExt cx="0" cy="0"/>
+        </a:xfrm>
+      </p:grpSpPr>
+      <p:sp>
+        <p:nvSpPr>
+          <p:cNvPr id="7" name="Rectangle 7">
+            <a:extLst>
+              <a:ext uri="{FF2B5EF4-FFF2-40B4-BE49-F238E27FC236}">
+                <a16:creationId xmlns:a16="http://schemas.microsoft.com/office/drawing/2014/main" id="{01F0A50A-1EEF-D043-8490-9F626DC7F347}"/>
+              </a:ext>
+            </a:extLst>
+          </p:cNvPr>
+          <p:cNvSpPr>
+            <a:spLocks noGrp="1" noChangeArrowheads="1"/>
+          </p:cNvSpPr>
+          <p:nvPr>
+            <p:ph type="sldNum" sz="quarter" idx="5"/>
+          </p:nvPr>
+        </p:nvSpPr>
+        <p:spPr>
+          <a:ln/>
+        </p:spPr>
+        <p:txBody>
+          <a:bodyPr/>
+          <a:lstStyle/>
+          <a:p>
+            <a:fld id="{09DE6CDC-0C78-884C-B7A9-8076A6825522}" type="slidenum">
+              <a:rPr lang="en-US" altLang="en-US"/>
+              <a:pPr/>
+              <a:t>45</a:t>
+            </a:fld>
+            <a:endParaRPr lang="en-US" altLang="en-US" dirty="0"/>
+          </a:p>
+        </p:txBody>
+      </p:sp>
+      <p:sp>
+        <p:nvSpPr>
+          <p:cNvPr id="109570" name="Rectangle 2">
+            <a:extLst>
+              <a:ext uri="{FF2B5EF4-FFF2-40B4-BE49-F238E27FC236}">
+                <a16:creationId xmlns:a16="http://schemas.microsoft.com/office/drawing/2014/main" id="{60C9A799-9C5D-6645-9827-E234D732637D}"/>
+              </a:ext>
+            </a:extLst>
+          </p:cNvPr>
+          <p:cNvSpPr>
+            <a:spLocks noGrp="1" noRot="1" noChangeAspect="1" noChangeArrowheads="1"/>
+          </p:cNvSpPr>
+          <p:nvPr>
+            <p:ph type="sldImg"/>
+          </p:nvPr>
+        </p:nvSpPr>
+        <p:spPr bwMode="auto">
+          <a:xfrm>
+            <a:off x="381000" y="685800"/>
+            <a:ext cx="6096000" cy="3429000"/>
+          </a:xfrm>
+          <a:prstGeom prst="rect">
+            <a:avLst/>
+          </a:prstGeom>
+          <a:solidFill>
+            <a:srgbClr val="FFFFFF"/>
+          </a:solidFill>
+          <a:ln>
+            <a:solidFill>
+              <a:srgbClr val="000000"/>
+            </a:solidFill>
+            <a:miter lim="800000"/>
+            <a:headEnd/>
+            <a:tailEnd/>
+          </a:ln>
+        </p:spPr>
+      </p:sp>
+      <p:sp>
+        <p:nvSpPr>
+          <p:cNvPr id="109571" name="Rectangle 3">
+            <a:extLst>
+              <a:ext uri="{FF2B5EF4-FFF2-40B4-BE49-F238E27FC236}">
+                <a16:creationId xmlns:a16="http://schemas.microsoft.com/office/drawing/2014/main" id="{6C1D94F5-66AD-E744-A0DD-41083E4F0581}"/>
+              </a:ext>
+            </a:extLst>
+          </p:cNvPr>
+          <p:cNvSpPr>
+            <a:spLocks noGrp="1" noChangeArrowheads="1"/>
+          </p:cNvSpPr>
+          <p:nvPr>
+            <p:ph type="body" idx="1"/>
+          </p:nvPr>
+        </p:nvSpPr>
+        <p:spPr bwMode="auto">
+          <a:xfrm>
+            <a:off x="914400" y="4343400"/>
+            <a:ext cx="5029200" cy="4114800"/>
+          </a:xfrm>
+          <a:prstGeom prst="rect">
+            <a:avLst/>
+          </a:prstGeom>
+          <a:solidFill>
+            <a:srgbClr val="FFFFFF"/>
+          </a:solidFill>
+          <a:ln>
+            <a:solidFill>
+              <a:srgbClr val="000000"/>
+            </a:solidFill>
+            <a:miter lim="800000"/>
+            <a:headEnd/>
+            <a:tailEnd/>
+          </a:ln>
+        </p:spPr>
+        <p:txBody>
+          <a:bodyPr/>
+          <a:lstStyle/>
+          <a:p>
+            <a:endParaRPr lang="en-US" altLang="en-US" dirty="0"/>
+          </a:p>
+        </p:txBody>
+      </p:sp>
+    </p:spTree>
     <p:extLst>
       <p:ext uri="{BB962C8B-B14F-4D97-AF65-F5344CB8AC3E}">
         <p14:creationId xmlns:p14="http://schemas.microsoft.com/office/powerpoint/2010/main" val="1617062910"/>
@@ -2182,44 +2267,7 @@
           <a:bodyPr/>
           <a:lstStyle/>
           <a:p>
-            <a:pPr marL="171450" indent="-171450">
-              <a:buFont typeface="Arial" panose="020B0604020202020204" pitchFamily="34" charset="0"/>
-              <a:buChar char="•"/>
-            </a:pPr>
-            <a:r>
-              <a:rPr lang="en-US" dirty="0"/>
-              <a:t>Depending on the scope of your analysis and the software you’re using you have a number of options</a:t>
-            </a:r>
-          </a:p>
-          <a:p>
-            <a:pPr marL="171450" indent="-171450">
-              <a:buFont typeface="Arial" panose="020B0604020202020204" pitchFamily="34" charset="0"/>
-              <a:buChar char="•"/>
-            </a:pPr>
-            <a:r>
-              <a:rPr lang="en-US" dirty="0"/>
-              <a:t>CMA (Comprehensive Meta-Analysis) allows direct entry of 100 different data formats</a:t>
-            </a:r>
-          </a:p>
-          <a:p>
-            <a:pPr marL="171450" indent="-171450">
-              <a:buFont typeface="Arial" panose="020B0604020202020204" pitchFamily="34" charset="0"/>
-              <a:buChar char="•"/>
-            </a:pPr>
-            <a:r>
-              <a:rPr lang="en-US" dirty="0"/>
-              <a:t>Online calculators can be used to hand calculate effect sizes using different data formats</a:t>
-            </a:r>
-          </a:p>
-          <a:p>
-            <a:pPr marL="171450" indent="-171450">
-              <a:buFont typeface="Arial" panose="020B0604020202020204" pitchFamily="34" charset="0"/>
-              <a:buChar char="•"/>
-            </a:pPr>
-            <a:r>
-              <a:rPr lang="en-US" dirty="0"/>
-              <a:t>R packages to compile effect sizes to prepare for analysis</a:t>
-            </a:r>
+            <a:endParaRPr lang="en-US" dirty="0"/>
           </a:p>
         </p:txBody>
       </p:sp>
@@ -2240,7 +2288,7 @@
           <a:p>
             <a:fld id="{700E2BA0-6B8B-7A40-9298-7B14ED4552A5}" type="slidenum">
               <a:rPr lang="en-US" smtClean="0"/>
-              <a:t>18</a:t>
+              <a:t>16</a:t>
             </a:fld>
             <a:endParaRPr lang="en-US" dirty="0"/>
           </a:p>
@@ -2249,7 +2297,7 @@
     </p:spTree>
     <p:extLst>
       <p:ext uri="{BB962C8B-B14F-4D97-AF65-F5344CB8AC3E}">
-        <p14:creationId xmlns:p14="http://schemas.microsoft.com/office/powerpoint/2010/main" val="2984545855"/>
+        <p14:creationId xmlns:p14="http://schemas.microsoft.com/office/powerpoint/2010/main" val="3995954578"/>
       </p:ext>
     </p:extLst>
   </p:cSld>
@@ -2303,7 +2351,44 @@
           <a:bodyPr/>
           <a:lstStyle/>
           <a:p>
-            <a:endParaRPr lang="en-US" dirty="0"/>
+            <a:pPr marL="171450" indent="-171450">
+              <a:buFont typeface="Arial" panose="020B0604020202020204" pitchFamily="34" charset="0"/>
+              <a:buChar char="•"/>
+            </a:pPr>
+            <a:r>
+              <a:rPr lang="en-US" dirty="0"/>
+              <a:t>Depending on the scope of your analysis and the software you’re using you have a number of options</a:t>
+            </a:r>
+          </a:p>
+          <a:p>
+            <a:pPr marL="171450" indent="-171450">
+              <a:buFont typeface="Arial" panose="020B0604020202020204" pitchFamily="34" charset="0"/>
+              <a:buChar char="•"/>
+            </a:pPr>
+            <a:r>
+              <a:rPr lang="en-US" dirty="0"/>
+              <a:t>CMA (Comprehensive Meta-Analysis) allows direct entry of 100 different data formats</a:t>
+            </a:r>
+          </a:p>
+          <a:p>
+            <a:pPr marL="171450" indent="-171450">
+              <a:buFont typeface="Arial" panose="020B0604020202020204" pitchFamily="34" charset="0"/>
+              <a:buChar char="•"/>
+            </a:pPr>
+            <a:r>
+              <a:rPr lang="en-US" dirty="0"/>
+              <a:t>Online calculators can be used to hand calculate effect sizes using different data formats</a:t>
+            </a:r>
+          </a:p>
+          <a:p>
+            <a:pPr marL="171450" indent="-171450">
+              <a:buFont typeface="Arial" panose="020B0604020202020204" pitchFamily="34" charset="0"/>
+              <a:buChar char="•"/>
+            </a:pPr>
+            <a:r>
+              <a:rPr lang="en-US" dirty="0"/>
+              <a:t>R packages to compile effect sizes to prepare for analysis</a:t>
+            </a:r>
           </a:p>
         </p:txBody>
       </p:sp>
@@ -2324,7 +2409,7 @@
           <a:p>
             <a:fld id="{700E2BA0-6B8B-7A40-9298-7B14ED4552A5}" type="slidenum">
               <a:rPr lang="en-US" smtClean="0"/>
-              <a:t>25</a:t>
+              <a:t>18</a:t>
             </a:fld>
             <a:endParaRPr lang="en-US" dirty="0"/>
           </a:p>
@@ -2333,7 +2418,7 @@
     </p:spTree>
     <p:extLst>
       <p:ext uri="{BB962C8B-B14F-4D97-AF65-F5344CB8AC3E}">
-        <p14:creationId xmlns:p14="http://schemas.microsoft.com/office/powerpoint/2010/main" val="3033674412"/>
+        <p14:creationId xmlns:p14="http://schemas.microsoft.com/office/powerpoint/2010/main" val="2984545855"/>
       </p:ext>
     </p:extLst>
   </p:cSld>
@@ -2408,7 +2493,7 @@
           <a:p>
             <a:fld id="{700E2BA0-6B8B-7A40-9298-7B14ED4552A5}" type="slidenum">
               <a:rPr lang="en-US" smtClean="0"/>
-              <a:t>26</a:t>
+              <a:t>25</a:t>
             </a:fld>
             <a:endParaRPr lang="en-US" dirty="0"/>
           </a:p>
@@ -2417,7 +2502,7 @@
     </p:spTree>
     <p:extLst>
       <p:ext uri="{BB962C8B-B14F-4D97-AF65-F5344CB8AC3E}">
-        <p14:creationId xmlns:p14="http://schemas.microsoft.com/office/powerpoint/2010/main" val="2899290946"/>
+        <p14:creationId xmlns:p14="http://schemas.microsoft.com/office/powerpoint/2010/main" val="3033674412"/>
       </p:ext>
     </p:extLst>
   </p:cSld>
@@ -8389,7 +8474,7 @@
 </file>
 
 <file path=ppt/slides/slide14.xml><?xml version="1.0" encoding="utf-8"?>
-<p:sld xmlns:a="http://schemas.openxmlformats.org/drawingml/2006/main" xmlns:r="http://schemas.openxmlformats.org/officeDocument/2006/relationships" xmlns:p="http://schemas.openxmlformats.org/presentationml/2006/main" show="0">
+<p:sld xmlns:a="http://schemas.openxmlformats.org/drawingml/2006/main" xmlns:r="http://schemas.openxmlformats.org/officeDocument/2006/relationships" xmlns:p="http://schemas.openxmlformats.org/presentationml/2006/main">
   <p:cSld>
     <p:spTree>
       <p:nvGrpSpPr>
@@ -8562,7 +8647,7 @@
 </file>
 
 <file path=ppt/slides/slide15.xml><?xml version="1.0" encoding="utf-8"?>
-<p:sld xmlns:a="http://schemas.openxmlformats.org/drawingml/2006/main" xmlns:r="http://schemas.openxmlformats.org/officeDocument/2006/relationships" xmlns:p="http://schemas.openxmlformats.org/presentationml/2006/main" show="0">
+<p:sld xmlns:a="http://schemas.openxmlformats.org/drawingml/2006/main" xmlns:r="http://schemas.openxmlformats.org/officeDocument/2006/relationships" xmlns:p="http://schemas.openxmlformats.org/presentationml/2006/main">
   <p:cSld>
     <p:spTree>
       <p:nvGrpSpPr>
@@ -8859,7 +8944,7 @@
 </file>
 
 <file path=ppt/slides/slide16.xml><?xml version="1.0" encoding="utf-8"?>
-<p:sld xmlns:a="http://schemas.openxmlformats.org/drawingml/2006/main" xmlns:r="http://schemas.openxmlformats.org/officeDocument/2006/relationships" xmlns:p="http://schemas.openxmlformats.org/presentationml/2006/main" show="0">
+<p:sld xmlns:a="http://schemas.openxmlformats.org/drawingml/2006/main" xmlns:r="http://schemas.openxmlformats.org/officeDocument/2006/relationships" xmlns:p="http://schemas.openxmlformats.org/presentationml/2006/main">
   <p:cSld>
     <p:spTree>
       <p:nvGrpSpPr>
@@ -9081,20 +9166,11 @@
           <a:p>
             <a:r>
               <a:rPr lang="en-AU" dirty="0"/>
-              <a:t>In the perfect world all studies are well described</a:t>
-            </a:r>
-          </a:p>
-          <a:p>
-            <a:endParaRPr lang="en-AU" dirty="0"/>
-          </a:p>
-          <a:p>
-            <a:r>
-              <a:rPr lang="en-AU" dirty="0"/>
-              <a:t>Sadly, we don’t live in a perfect world</a:t>
-            </a:r>
-          </a:p>
-          <a:p>
-            <a:endParaRPr lang="en-AU" dirty="0"/>
+              <a:t>In the perfect world all studies are well described. Sadly, this is often not the case.</a:t>
+            </a:r>
+          </a:p>
+          <a:p>
+            <a:endParaRPr lang="en-AU" sz="2200" dirty="0"/>
           </a:p>
           <a:p>
             <a:r>
@@ -9106,15 +9182,23 @@
             <a:pPr lvl="1"/>
             <a:r>
               <a:rPr lang="en-AU" dirty="0"/>
-              <a:t>You may need to use a number of formulas different to calculate effect sizes based on the information provided</a:t>
+              <a:t>Even after trying to extract maximal data from all studies you’ll often need to contact authors</a:t>
             </a:r>
           </a:p>
           <a:p>
             <a:pPr lvl="1"/>
+            <a:endParaRPr lang="en-AU" dirty="0"/>
+          </a:p>
+          <a:p>
+            <a:pPr lvl="1"/>
             <a:r>
               <a:rPr lang="en-AU" dirty="0"/>
-              <a:t>Even after trying to extract maximal data from all studies you’ll often need to contact authors</a:t>
-            </a:r>
+              <a:t>You may also need to use a number of formulas* different to calculate effect sizes based on the information provided</a:t>
+            </a:r>
+          </a:p>
+          <a:p>
+            <a:pPr lvl="1"/>
+            <a:endParaRPr lang="en-AU" dirty="0"/>
           </a:p>
           <a:p>
             <a:pPr marL="457200" lvl="1" indent="0">
@@ -9154,6 +9238,146 @@
               <a:t>16</a:t>
             </a:fld>
             <a:endParaRPr lang="en-US" dirty="0"/>
+          </a:p>
+        </p:txBody>
+      </p:sp>
+      <p:sp>
+        <p:nvSpPr>
+          <p:cNvPr id="4" name="TextBox 3">
+            <a:extLst>
+              <a:ext uri="{FF2B5EF4-FFF2-40B4-BE49-F238E27FC236}">
+                <a16:creationId xmlns:a16="http://schemas.microsoft.com/office/drawing/2014/main" id="{385876B1-08B6-214F-9CA2-52355D1C13F5}"/>
+              </a:ext>
+            </a:extLst>
+          </p:cNvPr>
+          <p:cNvSpPr txBox="1"/>
+          <p:nvPr/>
+        </p:nvSpPr>
+        <p:spPr>
+          <a:xfrm>
+            <a:off x="609600" y="6176963"/>
+            <a:ext cx="10344150" cy="584775"/>
+          </a:xfrm>
+          <a:prstGeom prst="rect">
+            <a:avLst/>
+          </a:prstGeom>
+          <a:noFill/>
+        </p:spPr>
+        <p:txBody>
+          <a:bodyPr wrap="square" rtlCol="0">
+            <a:spAutoFit/>
+          </a:bodyPr>
+          <a:lstStyle/>
+          <a:p>
+            <a:r>
+              <a:rPr lang="en-US" sz="1600" i="1" dirty="0">
+                <a:solidFill>
+                  <a:schemeClr val="tx1">
+                    <a:lumMod val="50000"/>
+                    <a:lumOff val="50000"/>
+                  </a:schemeClr>
+                </a:solidFill>
+              </a:rPr>
+              <a:t>* Useful article with formulas for doing this: </a:t>
+            </a:r>
+            <a:r>
+              <a:rPr lang="en-US" sz="1600" dirty="0" err="1">
+                <a:solidFill>
+                  <a:schemeClr val="tx1">
+                    <a:lumMod val="50000"/>
+                    <a:lumOff val="50000"/>
+                  </a:schemeClr>
+                </a:solidFill>
+              </a:rPr>
+              <a:t>Polanin</a:t>
+            </a:r>
+            <a:r>
+              <a:rPr lang="en-US" sz="1600" dirty="0">
+                <a:solidFill>
+                  <a:schemeClr val="tx1">
+                    <a:lumMod val="50000"/>
+                    <a:lumOff val="50000"/>
+                  </a:schemeClr>
+                </a:solidFill>
+              </a:rPr>
+              <a:t>, J. R., &amp; </a:t>
+            </a:r>
+            <a:r>
+              <a:rPr lang="en-US" sz="1600" dirty="0" err="1">
+                <a:solidFill>
+                  <a:schemeClr val="tx1">
+                    <a:lumMod val="50000"/>
+                    <a:lumOff val="50000"/>
+                  </a:schemeClr>
+                </a:solidFill>
+              </a:rPr>
+              <a:t>Snilstveit</a:t>
+            </a:r>
+            <a:r>
+              <a:rPr lang="en-US" sz="1600" dirty="0">
+                <a:solidFill>
+                  <a:schemeClr val="tx1">
+                    <a:lumMod val="50000"/>
+                    <a:lumOff val="50000"/>
+                  </a:schemeClr>
+                </a:solidFill>
+              </a:rPr>
+              <a:t>, B. (2016). Converting between effect sizes. </a:t>
+            </a:r>
+            <a:r>
+              <a:rPr lang="en-US" sz="1600" i="1" dirty="0">
+                <a:solidFill>
+                  <a:schemeClr val="tx1">
+                    <a:lumMod val="50000"/>
+                    <a:lumOff val="50000"/>
+                  </a:schemeClr>
+                </a:solidFill>
+              </a:rPr>
+              <a:t>Campbell Systematic Reviews</a:t>
+            </a:r>
+            <a:r>
+              <a:rPr lang="en-US" sz="1600" dirty="0">
+                <a:solidFill>
+                  <a:schemeClr val="tx1">
+                    <a:lumMod val="50000"/>
+                    <a:lumOff val="50000"/>
+                  </a:schemeClr>
+                </a:solidFill>
+              </a:rPr>
+              <a:t>, 12(1), 1-13. </a:t>
+            </a:r>
+            <a:r>
+              <a:rPr lang="en-US" sz="1600" dirty="0">
+                <a:solidFill>
+                  <a:srgbClr val="0563C1"/>
+                </a:solidFill>
+                <a:hlinkClick r:id="rId3"/>
+              </a:rPr>
+              <a:t>https://doi.org/10.4073/cmpn.</a:t>
+            </a:r>
+            <a:r>
+              <a:rPr lang="en-US" sz="1600" dirty="0">
+                <a:solidFill>
+                  <a:schemeClr val="tx1">
+                    <a:lumMod val="50000"/>
+                    <a:lumOff val="50000"/>
+                  </a:schemeClr>
+                </a:solidFill>
+                <a:hlinkClick r:id="rId3"/>
+              </a:rPr>
+              <a:t>2016.3</a:t>
+            </a:r>
+            <a:r>
+              <a:rPr lang="en-US" sz="1600" dirty="0">
+                <a:solidFill>
+                  <a:schemeClr val="tx1">
+                    <a:lumMod val="50000"/>
+                    <a:lumOff val="50000"/>
+                  </a:schemeClr>
+                </a:solidFill>
+              </a:rPr>
+              <a:t>  </a:t>
+            </a:r>
           </a:p>
         </p:txBody>
       </p:sp>
@@ -12596,7 +12820,7 @@
 </file>
 
 <file path=ppt/slides/slide31.xml><?xml version="1.0" encoding="utf-8"?>
-<p:sld xmlns:a="http://schemas.openxmlformats.org/drawingml/2006/main" xmlns:r="http://schemas.openxmlformats.org/officeDocument/2006/relationships" xmlns:p="http://schemas.openxmlformats.org/presentationml/2006/main" show="0">
+<p:sld xmlns:a="http://schemas.openxmlformats.org/drawingml/2006/main" xmlns:r="http://schemas.openxmlformats.org/officeDocument/2006/relationships" xmlns:p="http://schemas.openxmlformats.org/presentationml/2006/main">
   <p:cSld>
     <p:spTree>
       <p:nvGrpSpPr>
@@ -12658,12 +12882,108 @@
         </p:nvSpPr>
         <p:spPr/>
         <p:txBody>
-          <a:bodyPr/>
-          <a:lstStyle/>
-          <a:p>
+          <a:bodyPr>
+            <a:normAutofit/>
+          </a:bodyPr>
+          <a:lstStyle/>
+          <a:p>
+            <a:pPr>
+              <a:lnSpc>
+                <a:spcPct val="100000"/>
+              </a:lnSpc>
+              <a:spcBef>
+                <a:spcPts val="0"/>
+              </a:spcBef>
+            </a:pPr>
+            <a:r>
+              <a:rPr lang="en-US" sz="2400" dirty="0"/>
+              <a:t>To conduct the meta-analysis, you will need data properly formatted with an effect size and variance estimate for all included studies</a:t>
+            </a:r>
+          </a:p>
+          <a:p>
+            <a:pPr>
+              <a:lnSpc>
+                <a:spcPct val="100000"/>
+              </a:lnSpc>
+              <a:spcBef>
+                <a:spcPts val="0"/>
+              </a:spcBef>
+            </a:pPr>
+            <a:endParaRPr lang="en-US" sz="2200" dirty="0"/>
+          </a:p>
+          <a:p>
+            <a:pPr>
+              <a:lnSpc>
+                <a:spcPct val="100000"/>
+              </a:lnSpc>
+              <a:spcBef>
+                <a:spcPts val="0"/>
+              </a:spcBef>
+            </a:pPr>
+            <a:r>
+              <a:rPr lang="en-US" sz="2400" dirty="0"/>
+              <a:t>You will also need to consider the structure of your data and relations between effect estimates. For example,</a:t>
+            </a:r>
+          </a:p>
+          <a:p>
+            <a:pPr lvl="1">
+              <a:lnSpc>
+                <a:spcPct val="100000"/>
+              </a:lnSpc>
+              <a:spcBef>
+                <a:spcPts val="0"/>
+              </a:spcBef>
+            </a:pPr>
+            <a:r>
+              <a:rPr lang="en-US" sz="2200" dirty="0"/>
+              <a:t>Are multiple effects from the same citation?</a:t>
+            </a:r>
+          </a:p>
+          <a:p>
+            <a:pPr lvl="1">
+              <a:lnSpc>
+                <a:spcPct val="100000"/>
+              </a:lnSpc>
+              <a:spcBef>
+                <a:spcPts val="0"/>
+              </a:spcBef>
+            </a:pPr>
+            <a:r>
+              <a:rPr lang="en-US" sz="2200" dirty="0"/>
+              <a:t>Is it possible multiple effects (even from different citations) involve the same participants?</a:t>
+            </a:r>
+          </a:p>
+          <a:p>
+            <a:pPr lvl="1">
+              <a:lnSpc>
+                <a:spcPct val="100000"/>
+              </a:lnSpc>
+              <a:spcBef>
+                <a:spcPts val="0"/>
+              </a:spcBef>
+            </a:pPr>
+            <a:endParaRPr lang="en-US" sz="2200" dirty="0"/>
+          </a:p>
+          <a:p>
+            <a:pPr>
+              <a:lnSpc>
+                <a:spcPct val="100000"/>
+              </a:lnSpc>
+              <a:spcBef>
+                <a:spcPts val="0"/>
+              </a:spcBef>
+            </a:pPr>
+            <a:r>
+              <a:rPr lang="en-US" sz="2600" dirty="0"/>
+              <a:t>If there are </a:t>
+            </a:r>
             <a:r>
               <a:rPr lang="en-US" dirty="0"/>
-              <a:t>After the ma</a:t>
+              <a:t>interdependencies</a:t>
+            </a:r>
+            <a:r>
+              <a:rPr lang="en-US" sz="2600" dirty="0"/>
+              <a:t>, you will need to specify a model that handles this type of data structure</a:t>
             </a:r>
           </a:p>
         </p:txBody>
@@ -13797,8 +14117,8 @@
         </p:nvSpPr>
         <p:spPr>
           <a:xfrm>
-            <a:off x="185723" y="4905593"/>
-            <a:ext cx="3512517" cy="1815882"/>
+            <a:off x="158525" y="5461694"/>
+            <a:ext cx="3512517" cy="1077218"/>
           </a:xfrm>
           <a:prstGeom prst="rect">
             <a:avLst/>
@@ -13820,7 +14140,7 @@
                   </a:schemeClr>
                 </a:solidFill>
               </a:rPr>
-              <a:t>Forest plot on the effects of standalone mindfulness exercises on anxiety symptoms. From: Blanck, P., Perleth, S., Heidenreich, T., Kröger, P., Ditzen, B., Bents, H., &amp; Mander, J. (2018). </a:t>
+              <a:t>Blanck, P., Perleth, S., Heidenreich, T., Kröger, P., Ditzen, B., Bents, H., &amp; Mander, J. (2018). </a:t>
             </a:r>
             <a:r>
               <a:rPr lang="en-US" sz="1600" i="1" dirty="0">
@@ -14267,7 +14587,7 @@
 </file>
 
 <file path=ppt/slides/slide38.xml><?xml version="1.0" encoding="utf-8"?>
-<p:sld xmlns:a="http://schemas.openxmlformats.org/drawingml/2006/main" xmlns:r="http://schemas.openxmlformats.org/officeDocument/2006/relationships" xmlns:p="http://schemas.openxmlformats.org/presentationml/2006/main" show="0">
+<p:sld xmlns:a="http://schemas.openxmlformats.org/drawingml/2006/main" xmlns:r="http://schemas.openxmlformats.org/officeDocument/2006/relationships" xmlns:p="http://schemas.openxmlformats.org/presentationml/2006/main">
   <p:cSld>
     <p:spTree>
       <p:nvGrpSpPr>
@@ -14329,10 +14649,54 @@
         </p:nvSpPr>
         <p:spPr/>
         <p:txBody>
-          <a:bodyPr/>
-          <a:lstStyle/>
+          <a:bodyPr>
+            <a:normAutofit lnSpcReduction="10000"/>
+          </a:bodyPr>
+          <a:lstStyle/>
+          <a:p>
+            <a:r>
+              <a:rPr lang="en-US" dirty="0"/>
+              <a:t>Publication bias occurs when the outcome of a study influences the likelihood it will be published</a:t>
+            </a:r>
+          </a:p>
           <a:p>
             <a:endParaRPr lang="en-US" dirty="0"/>
+          </a:p>
+          <a:p>
+            <a:r>
+              <a:rPr lang="en-US" dirty="0"/>
+              <a:t>It is important to try to understand whether the results of a meta-analysis may be influenced by publication bias</a:t>
+            </a:r>
+          </a:p>
+          <a:p>
+            <a:endParaRPr lang="en-US" dirty="0"/>
+          </a:p>
+          <a:p>
+            <a:r>
+              <a:rPr lang="en-US" dirty="0"/>
+              <a:t>Several methods</a:t>
+            </a:r>
+          </a:p>
+          <a:p>
+            <a:pPr lvl="1"/>
+            <a:r>
+              <a:rPr lang="en-US" dirty="0"/>
+              <a:t>Egger’s test</a:t>
+            </a:r>
+          </a:p>
+          <a:p>
+            <a:pPr lvl="1"/>
+            <a:r>
+              <a:rPr lang="en-US" dirty="0"/>
+              <a:t>Rosenthal’s fail-safe N</a:t>
+            </a:r>
+          </a:p>
+          <a:p>
+            <a:pPr lvl="1"/>
+            <a:r>
+              <a:rPr lang="en-US" dirty="0"/>
+              <a:t>Trim-and-fill funnel plot</a:t>
+            </a:r>
           </a:p>
         </p:txBody>
       </p:sp>
@@ -14397,7 +14761,13 @@
       </p:grpSpPr>
       <p:sp>
         <p:nvSpPr>
-          <p:cNvPr id="2" name="Title 1"/>
+          <p:cNvPr id="2" name="Title 1">
+            <a:extLst>
+              <a:ext uri="{FF2B5EF4-FFF2-40B4-BE49-F238E27FC236}">
+                <a16:creationId xmlns:a16="http://schemas.microsoft.com/office/drawing/2014/main" id="{ED9D6FA6-326B-0147-BAE7-8741F3E6548E}"/>
+              </a:ext>
+            </a:extLst>
+          </p:cNvPr>
           <p:cNvSpPr>
             <a:spLocks noGrp="1"/>
           </p:cNvSpPr>
@@ -14412,14 +14782,20 @@
           <a:p>
             <a:r>
               <a:rPr lang="en-US" dirty="0"/>
-              <a:t>Useful R packages</a:t>
-            </a:r>
-          </a:p>
-        </p:txBody>
-      </p:sp>
-      <p:sp>
-        <p:nvSpPr>
-          <p:cNvPr id="3" name="Content Placeholder 2"/>
+              <a:t>Evaluating for publication bias</a:t>
+            </a:r>
+          </a:p>
+        </p:txBody>
+      </p:sp>
+      <p:sp>
+        <p:nvSpPr>
+          <p:cNvPr id="4" name="Content Placeholder 3">
+            <a:extLst>
+              <a:ext uri="{FF2B5EF4-FFF2-40B4-BE49-F238E27FC236}">
+                <a16:creationId xmlns:a16="http://schemas.microsoft.com/office/drawing/2014/main" id="{053840B1-C8E1-FD47-BF7A-015097CA5203}"/>
+              </a:ext>
+            </a:extLst>
+          </p:cNvPr>
           <p:cNvSpPr>
             <a:spLocks noGrp="1"/>
           </p:cNvSpPr>
@@ -14434,102 +14810,26 @@
           </a:bodyPr>
           <a:lstStyle/>
           <a:p>
-            <a:pPr>
-              <a:lnSpc>
-                <a:spcPct val="120000"/>
-              </a:lnSpc>
-              <a:spcBef>
-                <a:spcPts val="0"/>
-              </a:spcBef>
-            </a:pPr>
-            <a:r>
-              <a:rPr lang="en-US" dirty="0">
-                <a:latin typeface="Courier" pitchFamily="2" charset="0"/>
-                <a:hlinkClick r:id="rId2"/>
-              </a:rPr>
-              <a:t>metafor</a:t>
-            </a:r>
-            <a:endParaRPr lang="en-US" dirty="0">
-              <a:latin typeface="Courier" pitchFamily="2" charset="0"/>
-            </a:endParaRPr>
-          </a:p>
-          <a:p>
-            <a:pPr lvl="1">
-              <a:lnSpc>
-                <a:spcPct val="120000"/>
-              </a:lnSpc>
-              <a:spcBef>
-                <a:spcPts val="0"/>
-              </a:spcBef>
-            </a:pPr>
             <a:r>
               <a:rPr lang="en-US" dirty="0"/>
-              <a:t>Good all-round package for running meta-analysis and meta-regression</a:t>
-            </a:r>
-          </a:p>
-          <a:p>
-            <a:pPr>
-              <a:lnSpc>
-                <a:spcPct val="120000"/>
-              </a:lnSpc>
-              <a:spcBef>
-                <a:spcPts val="0"/>
-              </a:spcBef>
-            </a:pPr>
-            <a:endParaRPr lang="en-US" dirty="0"/>
-          </a:p>
-          <a:p>
-            <a:pPr>
-              <a:lnSpc>
-                <a:spcPct val="120000"/>
-              </a:lnSpc>
-              <a:spcBef>
-                <a:spcPts val="0"/>
-              </a:spcBef>
-            </a:pPr>
-            <a:r>
-              <a:rPr lang="en-US" dirty="0">
-                <a:latin typeface="Courier" pitchFamily="2" charset="0"/>
-                <a:hlinkClick r:id="rId3"/>
-              </a:rPr>
-              <a:t>robumeta</a:t>
-            </a:r>
-            <a:endParaRPr lang="en-US" dirty="0">
-              <a:latin typeface="Courier" pitchFamily="2" charset="0"/>
-            </a:endParaRPr>
-          </a:p>
-          <a:p>
-            <a:pPr lvl="1">
-              <a:lnSpc>
-                <a:spcPct val="120000"/>
-              </a:lnSpc>
-              <a:spcBef>
-                <a:spcPts val="0"/>
-              </a:spcBef>
-            </a:pPr>
+              <a:t>Funnel plot (left) and trim-and-fill funnel plot (right)</a:t>
+            </a:r>
+          </a:p>
+          <a:p>
+            <a:pPr lvl="1"/>
             <a:r>
               <a:rPr lang="en-US" dirty="0"/>
-              <a:t>Good for meta-analyses where effects have a high degree of interdependence (note that this type of can also be be conducted using </a:t>
-            </a:r>
-            <a:r>
-              <a:rPr lang="en-US" dirty="0">
-                <a:latin typeface="Courier" pitchFamily="2" charset="0"/>
-              </a:rPr>
-              <a:t>metafor</a:t>
-            </a:r>
-            <a:r>
-              <a:rPr lang="en-US" dirty="0"/>
-              <a:t>)</a:t>
-            </a:r>
-          </a:p>
-        </p:txBody>
-      </p:sp>
-      <p:sp>
-        <p:nvSpPr>
-          <p:cNvPr id="4" name="Slide Number Placeholder 3">
-            <a:extLst>
-              <a:ext uri="{FF2B5EF4-FFF2-40B4-BE49-F238E27FC236}">
-                <a16:creationId xmlns:a16="http://schemas.microsoft.com/office/drawing/2014/main" id="{586B4C11-EB79-CE43-B4F0-643D9F893A55}"/>
+              <a:t>Asymmetry may indicate publication bias</a:t>
+            </a:r>
+          </a:p>
+        </p:txBody>
+      </p:sp>
+      <p:sp>
+        <p:nvSpPr>
+          <p:cNvPr id="3" name="Slide Number Placeholder 2">
+            <a:extLst>
+              <a:ext uri="{FF2B5EF4-FFF2-40B4-BE49-F238E27FC236}">
+                <a16:creationId xmlns:a16="http://schemas.microsoft.com/office/drawing/2014/main" id="{8DEBDB40-A5DC-1540-BC3F-3EC913B7E1A4}"/>
               </a:ext>
             </a:extLst>
           </p:cNvPr>
@@ -14553,10 +14853,197 @@
           </a:p>
         </p:txBody>
       </p:sp>
+      <p:pic>
+        <p:nvPicPr>
+          <p:cNvPr id="4098" name="Picture 2">
+            <a:extLst>
+              <a:ext uri="{FF2B5EF4-FFF2-40B4-BE49-F238E27FC236}">
+                <a16:creationId xmlns:a16="http://schemas.microsoft.com/office/drawing/2014/main" id="{435894B8-ADDF-1D42-BA5F-BAAF9CB5E34A}"/>
+              </a:ext>
+            </a:extLst>
+          </p:cNvPr>
+          <p:cNvPicPr>
+            <a:picLocks noChangeAspect="1" noChangeArrowheads="1"/>
+          </p:cNvPicPr>
+          <p:nvPr/>
+        </p:nvPicPr>
+        <p:blipFill rotWithShape="1">
+          <a:blip r:embed="rId2">
+            <a:extLst>
+              <a:ext uri="{28A0092B-C50C-407E-A947-70E740481C1C}">
+                <a14:useLocalDpi xmlns:a14="http://schemas.microsoft.com/office/drawing/2010/main" val="0"/>
+              </a:ext>
+            </a:extLst>
+          </a:blip>
+          <a:srcRect b="53699"/>
+          <a:stretch/>
+        </p:blipFill>
+        <p:spPr bwMode="auto">
+          <a:xfrm>
+            <a:off x="930777" y="2959495"/>
+            <a:ext cx="4327023" cy="3217468"/>
+          </a:xfrm>
+          <a:prstGeom prst="rect">
+            <a:avLst/>
+          </a:prstGeom>
+          <a:noFill/>
+          <a:extLst>
+            <a:ext uri="{909E8E84-426E-40DD-AFC4-6F175D3DCCD1}">
+              <a14:hiddenFill xmlns:a14="http://schemas.microsoft.com/office/drawing/2010/main">
+                <a:solidFill>
+                  <a:srgbClr val="FFFFFF"/>
+                </a:solidFill>
+              </a14:hiddenFill>
+            </a:ext>
+          </a:extLst>
+        </p:spPr>
+      </p:pic>
+      <p:pic>
+        <p:nvPicPr>
+          <p:cNvPr id="6" name="Picture 2">
+            <a:extLst>
+              <a:ext uri="{FF2B5EF4-FFF2-40B4-BE49-F238E27FC236}">
+                <a16:creationId xmlns:a16="http://schemas.microsoft.com/office/drawing/2014/main" id="{6C0526F9-7BE1-B740-A98D-67F50C264FB2}"/>
+              </a:ext>
+            </a:extLst>
+          </p:cNvPr>
+          <p:cNvPicPr>
+            <a:picLocks noChangeAspect="1" noChangeArrowheads="1"/>
+          </p:cNvPicPr>
+          <p:nvPr/>
+        </p:nvPicPr>
+        <p:blipFill rotWithShape="1">
+          <a:blip r:embed="rId2">
+            <a:extLst>
+              <a:ext uri="{28A0092B-C50C-407E-A947-70E740481C1C}">
+                <a14:useLocalDpi xmlns:a14="http://schemas.microsoft.com/office/drawing/2010/main" val="0"/>
+              </a:ext>
+            </a:extLst>
+          </a:blip>
+          <a:srcRect t="50843"/>
+          <a:stretch/>
+        </p:blipFill>
+        <p:spPr bwMode="auto">
+          <a:xfrm>
+            <a:off x="6042803" y="2826171"/>
+            <a:ext cx="4195221" cy="3311898"/>
+          </a:xfrm>
+          <a:prstGeom prst="rect">
+            <a:avLst/>
+          </a:prstGeom>
+          <a:noFill/>
+          <a:extLst>
+            <a:ext uri="{909E8E84-426E-40DD-AFC4-6F175D3DCCD1}">
+              <a14:hiddenFill xmlns:a14="http://schemas.microsoft.com/office/drawing/2010/main">
+                <a:solidFill>
+                  <a:srgbClr val="FFFFFF"/>
+                </a:solidFill>
+              </a14:hiddenFill>
+            </a:ext>
+          </a:extLst>
+        </p:spPr>
+      </p:pic>
+      <p:sp>
+        <p:nvSpPr>
+          <p:cNvPr id="7" name="TextBox 6">
+            <a:extLst>
+              <a:ext uri="{FF2B5EF4-FFF2-40B4-BE49-F238E27FC236}">
+                <a16:creationId xmlns:a16="http://schemas.microsoft.com/office/drawing/2014/main" id="{2777E034-5EA0-6A49-A31F-E0173AF04FD6}"/>
+              </a:ext>
+            </a:extLst>
+          </p:cNvPr>
+          <p:cNvSpPr txBox="1"/>
+          <p:nvPr/>
+        </p:nvSpPr>
+        <p:spPr>
+          <a:xfrm>
+            <a:off x="139475" y="6176963"/>
+            <a:ext cx="10515600" cy="584775"/>
+          </a:xfrm>
+          <a:prstGeom prst="rect">
+            <a:avLst/>
+          </a:prstGeom>
+          <a:noFill/>
+        </p:spPr>
+        <p:txBody>
+          <a:bodyPr wrap="square" rtlCol="0">
+            <a:spAutoFit/>
+          </a:bodyPr>
+          <a:lstStyle/>
+          <a:p>
+            <a:r>
+              <a:rPr lang="en-US" sz="1600" dirty="0" err="1">
+                <a:solidFill>
+                  <a:schemeClr val="tx1">
+                    <a:lumMod val="50000"/>
+                    <a:lumOff val="50000"/>
+                  </a:schemeClr>
+                </a:solidFill>
+              </a:rPr>
+              <a:t>Beelmann</a:t>
+            </a:r>
+            <a:r>
+              <a:rPr lang="en-US" sz="1600" dirty="0">
+                <a:solidFill>
+                  <a:schemeClr val="tx1">
+                    <a:lumMod val="50000"/>
+                    <a:lumOff val="50000"/>
+                  </a:schemeClr>
+                </a:solidFill>
+              </a:rPr>
+              <a:t>, A., &amp; </a:t>
+            </a:r>
+            <a:r>
+              <a:rPr lang="en-US" sz="1600" dirty="0" err="1">
+                <a:solidFill>
+                  <a:schemeClr val="tx1">
+                    <a:lumMod val="50000"/>
+                    <a:lumOff val="50000"/>
+                  </a:schemeClr>
+                </a:solidFill>
+              </a:rPr>
+              <a:t>Lösel</a:t>
+            </a:r>
+            <a:r>
+              <a:rPr lang="en-US" sz="1600" dirty="0">
+                <a:solidFill>
+                  <a:schemeClr val="tx1">
+                    <a:lumMod val="50000"/>
+                    <a:lumOff val="50000"/>
+                  </a:schemeClr>
+                </a:solidFill>
+              </a:rPr>
+              <a:t>, F. (2020). A comprehensive meta-analysis of randomized evaluations of the effect of child social skills training on antisocial development. </a:t>
+            </a:r>
+            <a:r>
+              <a:rPr lang="en-US" sz="1600" i="1" dirty="0">
+                <a:solidFill>
+                  <a:schemeClr val="tx1">
+                    <a:lumMod val="50000"/>
+                    <a:lumOff val="50000"/>
+                  </a:schemeClr>
+                </a:solidFill>
+              </a:rPr>
+              <a:t>Journal of Developmental and Life-Course Criminology</a:t>
+            </a:r>
+            <a:r>
+              <a:rPr lang="en-US" sz="1600" dirty="0">
+                <a:solidFill>
+                  <a:schemeClr val="tx1">
+                    <a:lumMod val="50000"/>
+                    <a:lumOff val="50000"/>
+                  </a:schemeClr>
+                </a:solidFill>
+              </a:rPr>
+              <a:t>, 1-25.</a:t>
+            </a:r>
+          </a:p>
+        </p:txBody>
+      </p:sp>
     </p:spTree>
     <p:extLst>
       <p:ext uri="{BB962C8B-B14F-4D97-AF65-F5344CB8AC3E}">
-        <p14:creationId xmlns:p14="http://schemas.microsoft.com/office/powerpoint/2010/main" val="3728251840"/>
+        <p14:creationId xmlns:p14="http://schemas.microsoft.com/office/powerpoint/2010/main" val="241828182"/>
       </p:ext>
     </p:extLst>
   </p:cSld>
@@ -14739,7 +15226,7 @@
           <a:p>
             <a:r>
               <a:rPr lang="en-US" dirty="0"/>
-              <a:t>Other useful software</a:t>
+              <a:t>Useful R packages</a:t>
             </a:r>
           </a:p>
         </p:txBody>
@@ -14761,27 +15248,92 @@
           </a:bodyPr>
           <a:lstStyle/>
           <a:p>
+            <a:pPr>
+              <a:lnSpc>
+                <a:spcPct val="120000"/>
+              </a:lnSpc>
+              <a:spcBef>
+                <a:spcPts val="0"/>
+              </a:spcBef>
+            </a:pPr>
+            <a:r>
+              <a:rPr lang="en-US" dirty="0">
+                <a:latin typeface="Courier" pitchFamily="2" charset="0"/>
+                <a:hlinkClick r:id="rId2"/>
+              </a:rPr>
+              <a:t>metafor</a:t>
+            </a:r>
+            <a:endParaRPr lang="en-US" dirty="0">
+              <a:latin typeface="Courier" pitchFamily="2" charset="0"/>
+            </a:endParaRPr>
+          </a:p>
+          <a:p>
+            <a:pPr lvl="1">
+              <a:lnSpc>
+                <a:spcPct val="120000"/>
+              </a:lnSpc>
+              <a:spcBef>
+                <a:spcPts val="0"/>
+              </a:spcBef>
+            </a:pPr>
             <a:r>
               <a:rPr lang="en-US" dirty="0"/>
-              <a:t>STATA</a:t>
-            </a:r>
-          </a:p>
-          <a:p>
+              <a:t>Good all-round package for running meta-analysis and meta-regression</a:t>
+            </a:r>
+          </a:p>
+          <a:p>
+            <a:pPr>
+              <a:lnSpc>
+                <a:spcPct val="120000"/>
+              </a:lnSpc>
+              <a:spcBef>
+                <a:spcPts val="0"/>
+              </a:spcBef>
+            </a:pPr>
             <a:endParaRPr lang="en-US" dirty="0"/>
           </a:p>
           <a:p>
+            <a:pPr>
+              <a:lnSpc>
+                <a:spcPct val="120000"/>
+              </a:lnSpc>
+              <a:spcBef>
+                <a:spcPts val="0"/>
+              </a:spcBef>
+            </a:pPr>
+            <a:r>
+              <a:rPr lang="en-US" dirty="0">
+                <a:latin typeface="Courier" pitchFamily="2" charset="0"/>
+                <a:hlinkClick r:id="rId3"/>
+              </a:rPr>
+              <a:t>robumeta</a:t>
+            </a:r>
+            <a:endParaRPr lang="en-US" dirty="0">
+              <a:latin typeface="Courier" pitchFamily="2" charset="0"/>
+            </a:endParaRPr>
+          </a:p>
+          <a:p>
+            <a:pPr lvl="1">
+              <a:lnSpc>
+                <a:spcPct val="120000"/>
+              </a:lnSpc>
+              <a:spcBef>
+                <a:spcPts val="0"/>
+              </a:spcBef>
+            </a:pPr>
             <a:r>
               <a:rPr lang="en-US" dirty="0"/>
-              <a:t>Comprehensive Meta-analysis (CMA)</a:t>
-            </a:r>
-          </a:p>
-          <a:p>
-            <a:endParaRPr lang="en-US" dirty="0"/>
-          </a:p>
-          <a:p>
+              <a:t>Good for meta-analyses where effects have a high degree of interdependence (note that this type of can also be be conducted using </a:t>
+            </a:r>
+            <a:r>
+              <a:rPr lang="en-US" dirty="0">
+                <a:latin typeface="Courier" pitchFamily="2" charset="0"/>
+              </a:rPr>
+              <a:t>metafor</a:t>
+            </a:r>
             <a:r>
               <a:rPr lang="en-US" dirty="0"/>
-              <a:t>JASP -  Bayesian approach to meta-analysis </a:t>
+              <a:t>)</a:t>
             </a:r>
           </a:p>
         </p:txBody>
@@ -14791,7 +15343,7 @@
           <p:cNvPr id="4" name="Slide Number Placeholder 3">
             <a:extLst>
               <a:ext uri="{FF2B5EF4-FFF2-40B4-BE49-F238E27FC236}">
-                <a16:creationId xmlns:a16="http://schemas.microsoft.com/office/drawing/2014/main" id="{67E924D9-C8DD-444C-B5E6-503779B2299A}"/>
+                <a16:creationId xmlns:a16="http://schemas.microsoft.com/office/drawing/2014/main" id="{586B4C11-EB79-CE43-B4F0-643D9F893A55}"/>
               </a:ext>
             </a:extLst>
           </p:cNvPr>
@@ -14818,7 +15370,7 @@
     </p:spTree>
     <p:extLst>
       <p:ext uri="{BB962C8B-B14F-4D97-AF65-F5344CB8AC3E}">
-        <p14:creationId xmlns:p14="http://schemas.microsoft.com/office/powerpoint/2010/main" val="1791351268"/>
+        <p14:creationId xmlns:p14="http://schemas.microsoft.com/office/powerpoint/2010/main" val="3728251840"/>
       </p:ext>
     </p:extLst>
   </p:cSld>
@@ -14829,7 +15381,7 @@
 </file>
 
 <file path=ppt/slides/slide41.xml><?xml version="1.0" encoding="utf-8"?>
-<p:sld xmlns:a="http://schemas.openxmlformats.org/drawingml/2006/main" xmlns:r="http://schemas.openxmlformats.org/officeDocument/2006/relationships" xmlns:p="http://schemas.openxmlformats.org/presentationml/2006/main" show="0">
+<p:sld xmlns:a="http://schemas.openxmlformats.org/drawingml/2006/main" xmlns:r="http://schemas.openxmlformats.org/officeDocument/2006/relationships" xmlns:p="http://schemas.openxmlformats.org/presentationml/2006/main">
   <p:cSld>
     <p:spTree>
       <p:nvGrpSpPr>
@@ -14847,13 +15399,7 @@
       </p:grpSpPr>
       <p:sp>
         <p:nvSpPr>
-          <p:cNvPr id="2" name="Title 1">
-            <a:extLst>
-              <a:ext uri="{FF2B5EF4-FFF2-40B4-BE49-F238E27FC236}">
-                <a16:creationId xmlns:a16="http://schemas.microsoft.com/office/drawing/2014/main" id="{D62BDF71-27FC-1E4C-8F50-BE65A42CE678}"/>
-              </a:ext>
-            </a:extLst>
-          </p:cNvPr>
+          <p:cNvPr id="2" name="Title 1"/>
           <p:cNvSpPr>
             <a:spLocks noGrp="1"/>
           </p:cNvSpPr>
@@ -14868,20 +15414,14 @@
           <a:p>
             <a:r>
               <a:rPr lang="en-US" dirty="0"/>
-              <a:t>Activity 2: Meta-analysis</a:t>
-            </a:r>
-          </a:p>
-        </p:txBody>
-      </p:sp>
-      <p:sp>
-        <p:nvSpPr>
-          <p:cNvPr id="11" name="Content Placeholder 10">
-            <a:extLst>
-              <a:ext uri="{FF2B5EF4-FFF2-40B4-BE49-F238E27FC236}">
-                <a16:creationId xmlns:a16="http://schemas.microsoft.com/office/drawing/2014/main" id="{41927FAB-67EE-444F-9E75-8A61DD6735EA}"/>
-              </a:ext>
-            </a:extLst>
-          </p:cNvPr>
+              <a:t>Other useful software</a:t>
+            </a:r>
+          </a:p>
+        </p:txBody>
+      </p:sp>
+      <p:sp>
+        <p:nvSpPr>
+          <p:cNvPr id="3" name="Content Placeholder 2"/>
           <p:cNvSpPr>
             <a:spLocks noGrp="1"/>
           </p:cNvSpPr>
@@ -14891,48 +15431,42 @@
         </p:nvSpPr>
         <p:spPr/>
         <p:txBody>
-          <a:bodyPr/>
-          <a:lstStyle/>
+          <a:bodyPr>
+            <a:normAutofit/>
+          </a:bodyPr>
+          <a:lstStyle/>
+          <a:p>
+            <a:r>
+              <a:rPr lang="en-US" dirty="0"/>
+              <a:t>STATA</a:t>
+            </a:r>
+          </a:p>
           <a:p>
             <a:endParaRPr lang="en-US" dirty="0"/>
           </a:p>
-        </p:txBody>
-      </p:sp>
-      <p:pic>
-        <p:nvPicPr>
-          <p:cNvPr id="12" name="Content Placeholder 7">
-            <a:extLst>
-              <a:ext uri="{FF2B5EF4-FFF2-40B4-BE49-F238E27FC236}">
-                <a16:creationId xmlns:a16="http://schemas.microsoft.com/office/drawing/2014/main" id="{C9BDC661-A53A-7F45-9933-E7A705D491F1}"/>
-              </a:ext>
-            </a:extLst>
-          </p:cNvPr>
-          <p:cNvPicPr>
-            <a:picLocks noChangeAspect="1"/>
-          </p:cNvPicPr>
-          <p:nvPr/>
-        </p:nvPicPr>
-        <p:blipFill rotWithShape="1">
-          <a:blip r:embed="rId2"/>
-          <a:srcRect t="15048" b="27913"/>
-          <a:stretch/>
-        </p:blipFill>
-        <p:spPr>
-          <a:xfrm>
-            <a:off x="9838591" y="230188"/>
-            <a:ext cx="2129866" cy="1214846"/>
-          </a:xfrm>
-          <a:prstGeom prst="rect">
-            <a:avLst/>
-          </a:prstGeom>
-        </p:spPr>
-      </p:pic>
-      <p:sp>
-        <p:nvSpPr>
-          <p:cNvPr id="3" name="Slide Number Placeholder 2">
-            <a:extLst>
-              <a:ext uri="{FF2B5EF4-FFF2-40B4-BE49-F238E27FC236}">
-                <a16:creationId xmlns:a16="http://schemas.microsoft.com/office/drawing/2014/main" id="{4618D91E-575B-0F45-B2A3-08BBEEB41068}"/>
+          <a:p>
+            <a:r>
+              <a:rPr lang="en-US" dirty="0"/>
+              <a:t>Comprehensive Meta-analysis (CMA)</a:t>
+            </a:r>
+          </a:p>
+          <a:p>
+            <a:endParaRPr lang="en-US" dirty="0"/>
+          </a:p>
+          <a:p>
+            <a:r>
+              <a:rPr lang="en-US" dirty="0"/>
+              <a:t>JASP -  Bayesian approach to meta-analysis </a:t>
+            </a:r>
+          </a:p>
+        </p:txBody>
+      </p:sp>
+      <p:sp>
+        <p:nvSpPr>
+          <p:cNvPr id="4" name="Slide Number Placeholder 3">
+            <a:extLst>
+              <a:ext uri="{FF2B5EF4-FFF2-40B4-BE49-F238E27FC236}">
+                <a16:creationId xmlns:a16="http://schemas.microsoft.com/office/drawing/2014/main" id="{67E924D9-C8DD-444C-B5E6-503779B2299A}"/>
               </a:ext>
             </a:extLst>
           </p:cNvPr>
@@ -14959,7 +15493,7 @@
     </p:spTree>
     <p:extLst>
       <p:ext uri="{BB962C8B-B14F-4D97-AF65-F5344CB8AC3E}">
-        <p14:creationId xmlns:p14="http://schemas.microsoft.com/office/powerpoint/2010/main" val="1387883484"/>
+        <p14:creationId xmlns:p14="http://schemas.microsoft.com/office/powerpoint/2010/main" val="1791351268"/>
       </p:ext>
     </p:extLst>
   </p:cSld>
@@ -14991,7 +15525,7 @@
           <p:cNvPr id="2" name="Title 1">
             <a:extLst>
               <a:ext uri="{FF2B5EF4-FFF2-40B4-BE49-F238E27FC236}">
-                <a16:creationId xmlns:a16="http://schemas.microsoft.com/office/drawing/2014/main" id="{6158C228-6CC8-2B4D-B8E5-6834FF61067D}"/>
+                <a16:creationId xmlns:a16="http://schemas.microsoft.com/office/drawing/2014/main" id="{D62BDF71-27FC-1E4C-8F50-BE65A42CE678}"/>
               </a:ext>
             </a:extLst>
           </p:cNvPr>
@@ -15009,17 +15543,17 @@
           <a:p>
             <a:r>
               <a:rPr lang="en-US" dirty="0"/>
-              <a:t>Other types of meta-analyses</a:t>
-            </a:r>
-          </a:p>
-        </p:txBody>
-      </p:sp>
-      <p:sp>
-        <p:nvSpPr>
-          <p:cNvPr id="3" name="Content Placeholder 2">
-            <a:extLst>
-              <a:ext uri="{FF2B5EF4-FFF2-40B4-BE49-F238E27FC236}">
-                <a16:creationId xmlns:a16="http://schemas.microsoft.com/office/drawing/2014/main" id="{95A82C37-B8B8-464F-A8A2-4F8E525B6850}"/>
+              <a:t>Activity 2: Meta-analysis</a:t>
+            </a:r>
+          </a:p>
+        </p:txBody>
+      </p:sp>
+      <p:sp>
+        <p:nvSpPr>
+          <p:cNvPr id="11" name="Content Placeholder 10">
+            <a:extLst>
+              <a:ext uri="{FF2B5EF4-FFF2-40B4-BE49-F238E27FC236}">
+                <a16:creationId xmlns:a16="http://schemas.microsoft.com/office/drawing/2014/main" id="{41927FAB-67EE-444F-9E75-8A61DD6735EA}"/>
               </a:ext>
             </a:extLst>
           </p:cNvPr>
@@ -15037,7 +15571,45 @@
           <a:p>
             <a:r>
               <a:rPr lang="en-US" dirty="0"/>
-              <a:t>Meta-analyses can be conducted using a variety of techniques, including:</a:t>
+              <a:t>Open </a:t>
+            </a:r>
+            <a:r>
+              <a:rPr lang="en-US" i="1" dirty="0"/>
+              <a:t>R</a:t>
+            </a:r>
+            <a:r>
+              <a:rPr lang="en-US" dirty="0"/>
+              <a:t> or </a:t>
+            </a:r>
+            <a:r>
+              <a:rPr lang="en-US" i="1" dirty="0" err="1"/>
+              <a:t>Rstudio</a:t>
+            </a:r>
+            <a:r>
+              <a:rPr lang="en-US" dirty="0"/>
+              <a:t> </a:t>
+            </a:r>
+          </a:p>
+          <a:p>
+            <a:endParaRPr lang="en-US" dirty="0"/>
+          </a:p>
+          <a:p>
+            <a:r>
+              <a:rPr lang="en-US" dirty="0"/>
+              <a:t>Go to the following URL:</a:t>
+            </a:r>
+          </a:p>
+          <a:p>
+            <a:pPr lvl="1"/>
+            <a:r>
+              <a:rPr lang="en-US" dirty="0">
+                <a:hlinkClick r:id="rId2"/>
+              </a:rPr>
+              <a:t>https://tmober.github.io/meta-workshop/example-meta-script.html</a:t>
+            </a:r>
+            <a:r>
+              <a:rPr lang="en-US" dirty="0"/>
+              <a:t> </a:t>
             </a:r>
           </a:p>
           <a:p>
@@ -15045,86 +15617,48 @@
             <a:endParaRPr lang="en-US" dirty="0"/>
           </a:p>
           <a:p>
-            <a:pPr lvl="1"/>
             <a:r>
               <a:rPr lang="en-US" dirty="0"/>
-              <a:t>Longitudinal meta-analysis (</a:t>
-            </a:r>
-            <a:r>
-              <a:rPr lang="en-US" dirty="0">
-                <a:hlinkClick r:id="rId3"/>
-              </a:rPr>
-              <a:t>metafor in R</a:t>
-            </a:r>
-            <a:r>
-              <a:rPr lang="en-US" dirty="0"/>
-              <a:t>)</a:t>
-            </a:r>
-          </a:p>
-          <a:p>
-            <a:pPr lvl="1"/>
-            <a:endParaRPr lang="en-US" dirty="0"/>
-          </a:p>
-          <a:p>
-            <a:pPr lvl="1"/>
-            <a:r>
-              <a:rPr lang="en-US" dirty="0"/>
-              <a:t>Structural Equation Modeling Meta-analysis (</a:t>
-            </a:r>
-            <a:r>
-              <a:rPr lang="en-US" dirty="0">
-                <a:hlinkClick r:id="rId4"/>
-              </a:rPr>
-              <a:t>metaSEM in R</a:t>
-            </a:r>
-            <a:r>
-              <a:rPr lang="en-US" dirty="0"/>
-              <a:t>)</a:t>
-            </a:r>
-          </a:p>
-          <a:p>
-            <a:pPr lvl="1"/>
-            <a:endParaRPr lang="en-US" dirty="0"/>
-          </a:p>
-          <a:p>
-            <a:pPr lvl="1"/>
-            <a:r>
-              <a:rPr lang="en-US" dirty="0"/>
-              <a:t>Bayesian meta-analysis (</a:t>
-            </a:r>
-            <a:r>
-              <a:rPr lang="en-US" dirty="0">
-                <a:hlinkClick r:id="rId5"/>
-              </a:rPr>
-              <a:t>JASP software</a:t>
-            </a:r>
-            <a:r>
-              <a:rPr lang="en-US" dirty="0"/>
-              <a:t>)</a:t>
-            </a:r>
-          </a:p>
-          <a:p>
-            <a:pPr lvl="1"/>
-            <a:endParaRPr lang="en-US" dirty="0"/>
-          </a:p>
-          <a:p>
-            <a:r>
-              <a:rPr lang="en-US" dirty="0"/>
-              <a:t>More new methods are constantly evolving!</a:t>
-            </a:r>
-          </a:p>
-          <a:p>
-            <a:pPr lvl="1"/>
-            <a:endParaRPr lang="en-US" dirty="0"/>
-          </a:p>
-        </p:txBody>
-      </p:sp>
-      <p:sp>
-        <p:nvSpPr>
-          <p:cNvPr id="4" name="Slide Number Placeholder 3">
-            <a:extLst>
-              <a:ext uri="{FF2B5EF4-FFF2-40B4-BE49-F238E27FC236}">
-                <a16:creationId xmlns:a16="http://schemas.microsoft.com/office/drawing/2014/main" id="{DB3E25E8-E879-8B43-B4F6-5DB517A7B86B}"/>
+              <a:t>Download the script and take a moment to install/load the required packages into your R library</a:t>
+            </a:r>
+          </a:p>
+        </p:txBody>
+      </p:sp>
+      <p:pic>
+        <p:nvPicPr>
+          <p:cNvPr id="12" name="Content Placeholder 7">
+            <a:extLst>
+              <a:ext uri="{FF2B5EF4-FFF2-40B4-BE49-F238E27FC236}">
+                <a16:creationId xmlns:a16="http://schemas.microsoft.com/office/drawing/2014/main" id="{C9BDC661-A53A-7F45-9933-E7A705D491F1}"/>
+              </a:ext>
+            </a:extLst>
+          </p:cNvPr>
+          <p:cNvPicPr>
+            <a:picLocks noChangeAspect="1"/>
+          </p:cNvPicPr>
+          <p:nvPr/>
+        </p:nvPicPr>
+        <p:blipFill rotWithShape="1">
+          <a:blip r:embed="rId3"/>
+          <a:srcRect t="15048" b="27913"/>
+          <a:stretch/>
+        </p:blipFill>
+        <p:spPr>
+          <a:xfrm>
+            <a:off x="9838591" y="230188"/>
+            <a:ext cx="2129866" cy="1214846"/>
+          </a:xfrm>
+          <a:prstGeom prst="rect">
+            <a:avLst/>
+          </a:prstGeom>
+        </p:spPr>
+      </p:pic>
+      <p:sp>
+        <p:nvSpPr>
+          <p:cNvPr id="3" name="Slide Number Placeholder 2">
+            <a:extLst>
+              <a:ext uri="{FF2B5EF4-FFF2-40B4-BE49-F238E27FC236}">
+                <a16:creationId xmlns:a16="http://schemas.microsoft.com/office/drawing/2014/main" id="{4618D91E-575B-0F45-B2A3-08BBEEB41068}"/>
               </a:ext>
             </a:extLst>
           </p:cNvPr>
@@ -15151,7 +15685,7 @@
     </p:spTree>
     <p:extLst>
       <p:ext uri="{BB962C8B-B14F-4D97-AF65-F5344CB8AC3E}">
-        <p14:creationId xmlns:p14="http://schemas.microsoft.com/office/powerpoint/2010/main" val="1112766340"/>
+        <p14:creationId xmlns:p14="http://schemas.microsoft.com/office/powerpoint/2010/main" val="1387883484"/>
       </p:ext>
     </p:extLst>
   </p:cSld>
@@ -15180,7 +15714,13 @@
       </p:grpSpPr>
       <p:sp>
         <p:nvSpPr>
-          <p:cNvPr id="2" name="Title 1"/>
+          <p:cNvPr id="2" name="Title 1">
+            <a:extLst>
+              <a:ext uri="{FF2B5EF4-FFF2-40B4-BE49-F238E27FC236}">
+                <a16:creationId xmlns:a16="http://schemas.microsoft.com/office/drawing/2014/main" id="{6158C228-6CC8-2B4D-B8E5-6834FF61067D}"/>
+              </a:ext>
+            </a:extLst>
+          </p:cNvPr>
           <p:cNvSpPr>
             <a:spLocks noGrp="1"/>
           </p:cNvSpPr>
@@ -15190,45 +15730,119 @@
         </p:nvSpPr>
         <p:spPr/>
         <p:txBody>
-          <a:bodyPr>
-            <a:normAutofit/>
-          </a:bodyPr>
-          <a:lstStyle/>
-          <a:p>
-            <a:r>
-              <a:rPr lang="en-GB" dirty="0">
-                <a:ea typeface="SimSun" panose="02010600030101010101" pitchFamily="2" charset="-122"/>
-                <a:cs typeface="Times New Roman" panose="02020603050405020304" pitchFamily="18" charset="0"/>
+          <a:bodyPr/>
+          <a:lstStyle/>
+          <a:p>
+            <a:r>
+              <a:rPr lang="en-US" dirty="0"/>
+              <a:t>Other types of meta-analyses</a:t>
+            </a:r>
+          </a:p>
+        </p:txBody>
+      </p:sp>
+      <p:sp>
+        <p:nvSpPr>
+          <p:cNvPr id="3" name="Content Placeholder 2">
+            <a:extLst>
+              <a:ext uri="{FF2B5EF4-FFF2-40B4-BE49-F238E27FC236}">
+                <a16:creationId xmlns:a16="http://schemas.microsoft.com/office/drawing/2014/main" id="{95A82C37-B8B8-464F-A8A2-4F8E525B6850}"/>
+              </a:ext>
+            </a:extLst>
+          </p:cNvPr>
+          <p:cNvSpPr>
+            <a:spLocks noGrp="1"/>
+          </p:cNvSpPr>
+          <p:nvPr>
+            <p:ph idx="1"/>
+          </p:nvPr>
+        </p:nvSpPr>
+        <p:spPr/>
+        <p:txBody>
+          <a:bodyPr/>
+          <a:lstStyle/>
+          <a:p>
+            <a:r>
+              <a:rPr lang="en-US" dirty="0"/>
+              <a:t>Meta-analyses can be conducted using a variety of techniques, including:</a:t>
+            </a:r>
+          </a:p>
+          <a:p>
+            <a:pPr lvl="1"/>
+            <a:endParaRPr lang="en-US" dirty="0"/>
+          </a:p>
+          <a:p>
+            <a:pPr lvl="1"/>
+            <a:r>
+              <a:rPr lang="en-US" dirty="0"/>
+              <a:t>Longitudinal meta-analysis (</a:t>
+            </a:r>
+            <a:r>
+              <a:rPr lang="en-US" dirty="0">
+                <a:hlinkClick r:id="rId3"/>
               </a:rPr>
-              <a:t>Reporting Results</a:t>
-            </a:r>
-            <a:endParaRPr lang="en-GB" dirty="0"/>
-          </a:p>
-        </p:txBody>
-      </p:sp>
-      <p:sp>
-        <p:nvSpPr>
-          <p:cNvPr id="3" name="Text Placeholder 2">
-            <a:extLst>
-              <a:ext uri="{FF2B5EF4-FFF2-40B4-BE49-F238E27FC236}">
-                <a16:creationId xmlns:a16="http://schemas.microsoft.com/office/drawing/2014/main" id="{ECE2A6F8-6277-1F43-937B-D430DFAFA42F}"/>
-              </a:ext>
-            </a:extLst>
-          </p:cNvPr>
-          <p:cNvSpPr>
-            <a:spLocks noGrp="1"/>
-          </p:cNvSpPr>
-          <p:nvPr>
-            <p:ph type="body" idx="1"/>
-          </p:nvPr>
-        </p:nvSpPr>
-        <p:spPr/>
-        <p:txBody>
-          <a:bodyPr/>
-          <a:lstStyle/>
-          <a:p>
+              <a:t>metafor in R</a:t>
+            </a:r>
+            <a:r>
+              <a:rPr lang="en-US" dirty="0"/>
+              <a:t>)</a:t>
+            </a:r>
+          </a:p>
+          <a:p>
+            <a:pPr lvl="1"/>
             <a:endParaRPr lang="en-US" dirty="0"/>
           </a:p>
+          <a:p>
+            <a:pPr lvl="1"/>
+            <a:r>
+              <a:rPr lang="en-US" dirty="0"/>
+              <a:t>Structural Equation Modeling Meta-analysis (</a:t>
+            </a:r>
+            <a:r>
+              <a:rPr lang="en-US" dirty="0">
+                <a:hlinkClick r:id="rId4"/>
+              </a:rPr>
+              <a:t>metaSEM in R</a:t>
+            </a:r>
+            <a:r>
+              <a:rPr lang="en-US" dirty="0"/>
+              <a:t>)</a:t>
+            </a:r>
+          </a:p>
+          <a:p>
+            <a:pPr lvl="1"/>
+            <a:endParaRPr lang="en-US" dirty="0"/>
+          </a:p>
+          <a:p>
+            <a:pPr lvl="1"/>
+            <a:r>
+              <a:rPr lang="en-US" dirty="0"/>
+              <a:t>Bayesian meta-analysis (</a:t>
+            </a:r>
+            <a:r>
+              <a:rPr lang="en-US" dirty="0">
+                <a:hlinkClick r:id="rId5"/>
+              </a:rPr>
+              <a:t>JASP software</a:t>
+            </a:r>
+            <a:r>
+              <a:rPr lang="en-US" dirty="0"/>
+              <a:t>)</a:t>
+            </a:r>
+          </a:p>
+          <a:p>
+            <a:pPr lvl="1"/>
+            <a:endParaRPr lang="en-US" dirty="0"/>
+          </a:p>
+          <a:p>
+            <a:r>
+              <a:rPr lang="en-US" dirty="0"/>
+              <a:t>More new methods are constantly evolving!</a:t>
+            </a:r>
+          </a:p>
+          <a:p>
+            <a:pPr lvl="1"/>
+            <a:endParaRPr lang="en-US" dirty="0"/>
+          </a:p>
         </p:txBody>
       </p:sp>
       <p:sp>
@@ -15236,7 +15850,7 @@
           <p:cNvPr id="4" name="Slide Number Placeholder 3">
             <a:extLst>
               <a:ext uri="{FF2B5EF4-FFF2-40B4-BE49-F238E27FC236}">
-                <a16:creationId xmlns:a16="http://schemas.microsoft.com/office/drawing/2014/main" id="{9A6FB26C-7539-D14E-8C63-0A45AC60056C}"/>
+                <a16:creationId xmlns:a16="http://schemas.microsoft.com/office/drawing/2014/main" id="{DB3E25E8-E879-8B43-B4F6-5DB517A7B86B}"/>
               </a:ext>
             </a:extLst>
           </p:cNvPr>
@@ -15263,7 +15877,7 @@
     </p:spTree>
     <p:extLst>
       <p:ext uri="{BB962C8B-B14F-4D97-AF65-F5344CB8AC3E}">
-        <p14:creationId xmlns:p14="http://schemas.microsoft.com/office/powerpoint/2010/main" val="1663166079"/>
+        <p14:creationId xmlns:p14="http://schemas.microsoft.com/office/powerpoint/2010/main" val="1112766340"/>
       </p:ext>
     </p:extLst>
   </p:cSld>
@@ -15292,15 +15906,9 @@
       </p:grpSpPr>
       <p:sp>
         <p:nvSpPr>
-          <p:cNvPr id="108546" name="Rectangle 2">
-            <a:extLst>
-              <a:ext uri="{FF2B5EF4-FFF2-40B4-BE49-F238E27FC236}">
-                <a16:creationId xmlns:a16="http://schemas.microsoft.com/office/drawing/2014/main" id="{D0636248-4CC9-7F4D-9503-4297A31F8082}"/>
-              </a:ext>
-            </a:extLst>
-          </p:cNvPr>
-          <p:cNvSpPr>
-            <a:spLocks noGrp="1" noChangeArrowheads="1"/>
+          <p:cNvPr id="2" name="Title 1"/>
+          <p:cNvSpPr>
+            <a:spLocks noGrp="1"/>
           </p:cNvSpPr>
           <p:nvPr>
             <p:ph type="title"/>
@@ -15308,141 +15916,53 @@
         </p:nvSpPr>
         <p:spPr/>
         <p:txBody>
-          <a:bodyPr/>
-          <a:lstStyle/>
-          <a:p>
-            <a:r>
-              <a:rPr lang="en-US" altLang="en-US" dirty="0"/>
-              <a:t>Manuscript Preparation</a:t>
-            </a:r>
-          </a:p>
-        </p:txBody>
-      </p:sp>
-      <p:sp>
-        <p:nvSpPr>
-          <p:cNvPr id="108547" name="Rectangle 3">
-            <a:extLst>
-              <a:ext uri="{FF2B5EF4-FFF2-40B4-BE49-F238E27FC236}">
-                <a16:creationId xmlns:a16="http://schemas.microsoft.com/office/drawing/2014/main" id="{6CC9FA01-D8F1-EE49-82A0-D7419AA85913}"/>
-              </a:ext>
-            </a:extLst>
-          </p:cNvPr>
-          <p:cNvSpPr>
-            <a:spLocks noGrp="1" noChangeArrowheads="1"/>
-          </p:cNvSpPr>
-          <p:nvPr>
-            <p:ph idx="1"/>
-          </p:nvPr>
-        </p:nvSpPr>
-        <p:spPr/>
-        <p:txBody>
           <a:bodyPr>
-            <a:noAutofit/>
+            <a:normAutofit/>
           </a:bodyPr>
           <a:lstStyle/>
           <a:p>
-            <a:pPr>
-              <a:lnSpc>
-                <a:spcPct val="120000"/>
-              </a:lnSpc>
-              <a:spcBef>
-                <a:spcPts val="0"/>
-              </a:spcBef>
-            </a:pPr>
-            <a:r>
-              <a:rPr lang="en-US" altLang="en-US" dirty="0"/>
-              <a:t>Somewhat different based on discipline, but ultimately, a typical manuscript describing a meta-analysis should include:</a:t>
-            </a:r>
-          </a:p>
-          <a:p>
-            <a:pPr lvl="1">
-              <a:lnSpc>
-                <a:spcPct val="120000"/>
-              </a:lnSpc>
-              <a:spcBef>
-                <a:spcPts val="0"/>
-              </a:spcBef>
-            </a:pPr>
-            <a:r>
-              <a:rPr lang="en-US" altLang="en-US" sz="2800" dirty="0"/>
-              <a:t>Introduction</a:t>
-            </a:r>
-          </a:p>
-          <a:p>
-            <a:pPr lvl="2">
-              <a:lnSpc>
-                <a:spcPct val="120000"/>
-              </a:lnSpc>
-              <a:spcBef>
-                <a:spcPts val="0"/>
-              </a:spcBef>
-            </a:pPr>
-            <a:r>
-              <a:rPr lang="en-US" altLang="en-US" sz="2200" dirty="0"/>
-              <a:t>Justifies why the review/meta-analysis was conducted</a:t>
-            </a:r>
-          </a:p>
-          <a:p>
-            <a:pPr lvl="2">
-              <a:lnSpc>
-                <a:spcPct val="120000"/>
-              </a:lnSpc>
-              <a:spcBef>
-                <a:spcPts val="0"/>
-              </a:spcBef>
-            </a:pPr>
-            <a:endParaRPr lang="en-US" altLang="en-US" sz="2200" dirty="0"/>
-          </a:p>
-          <a:p>
-            <a:pPr lvl="1">
-              <a:lnSpc>
-                <a:spcPct val="120000"/>
-              </a:lnSpc>
-              <a:spcBef>
-                <a:spcPts val="0"/>
-              </a:spcBef>
-            </a:pPr>
-            <a:r>
-              <a:rPr lang="en-US" altLang="en-US" sz="2800" dirty="0"/>
-              <a:t>Methods</a:t>
-            </a:r>
-          </a:p>
-          <a:p>
-            <a:pPr lvl="2">
-              <a:lnSpc>
-                <a:spcPct val="120000"/>
-              </a:lnSpc>
-              <a:spcBef>
-                <a:spcPts val="0"/>
-              </a:spcBef>
-            </a:pPr>
-            <a:r>
-              <a:rPr lang="en-US" altLang="en-US" sz="2200" dirty="0"/>
-              <a:t>Describe the literature search, specifically the databases used, and if the search was restricted in any way.</a:t>
-            </a:r>
-          </a:p>
-          <a:p>
-            <a:pPr lvl="2">
-              <a:lnSpc>
-                <a:spcPct val="120000"/>
-              </a:lnSpc>
-              <a:spcBef>
-                <a:spcPts val="0"/>
-              </a:spcBef>
-            </a:pPr>
-            <a:r>
-              <a:rPr lang="en-US" altLang="en-US" sz="2200" dirty="0"/>
-              <a:t>The selection process for articles, quality assessment, methods of data abstraction, and synthesis.</a:t>
-            </a:r>
-          </a:p>
-        </p:txBody>
-      </p:sp>
-      <p:sp>
-        <p:nvSpPr>
-          <p:cNvPr id="2" name="Slide Number Placeholder 1">
-            <a:extLst>
-              <a:ext uri="{FF2B5EF4-FFF2-40B4-BE49-F238E27FC236}">
-                <a16:creationId xmlns:a16="http://schemas.microsoft.com/office/drawing/2014/main" id="{0FAACA59-54A1-EE41-A618-F68DBDA59AF4}"/>
+            <a:r>
+              <a:rPr lang="en-GB" dirty="0">
+                <a:ea typeface="SimSun" panose="02010600030101010101" pitchFamily="2" charset="-122"/>
+                <a:cs typeface="Times New Roman" panose="02020603050405020304" pitchFamily="18" charset="0"/>
+              </a:rPr>
+              <a:t>Reporting Results</a:t>
+            </a:r>
+            <a:endParaRPr lang="en-GB" dirty="0"/>
+          </a:p>
+        </p:txBody>
+      </p:sp>
+      <p:sp>
+        <p:nvSpPr>
+          <p:cNvPr id="3" name="Text Placeholder 2">
+            <a:extLst>
+              <a:ext uri="{FF2B5EF4-FFF2-40B4-BE49-F238E27FC236}">
+                <a16:creationId xmlns:a16="http://schemas.microsoft.com/office/drawing/2014/main" id="{ECE2A6F8-6277-1F43-937B-D430DFAFA42F}"/>
+              </a:ext>
+            </a:extLst>
+          </p:cNvPr>
+          <p:cNvSpPr>
+            <a:spLocks noGrp="1"/>
+          </p:cNvSpPr>
+          <p:nvPr>
+            <p:ph type="body" idx="1"/>
+          </p:nvPr>
+        </p:nvSpPr>
+        <p:spPr/>
+        <p:txBody>
+          <a:bodyPr/>
+          <a:lstStyle/>
+          <a:p>
+            <a:endParaRPr lang="en-US" dirty="0"/>
+          </a:p>
+        </p:txBody>
+      </p:sp>
+      <p:sp>
+        <p:nvSpPr>
+          <p:cNvPr id="4" name="Slide Number Placeholder 3">
+            <a:extLst>
+              <a:ext uri="{FF2B5EF4-FFF2-40B4-BE49-F238E27FC236}">
+                <a16:creationId xmlns:a16="http://schemas.microsoft.com/office/drawing/2014/main" id="{9A6FB26C-7539-D14E-8C63-0A45AC60056C}"/>
               </a:ext>
             </a:extLst>
           </p:cNvPr>
@@ -15467,6 +15987,11 @@
         </p:txBody>
       </p:sp>
     </p:spTree>
+    <p:extLst>
+      <p:ext uri="{BB962C8B-B14F-4D97-AF65-F5344CB8AC3E}">
+        <p14:creationId xmlns:p14="http://schemas.microsoft.com/office/powerpoint/2010/main" val="1663166079"/>
+      </p:ext>
+    </p:extLst>
   </p:cSld>
   <p:clrMapOvr>
     <a:masterClrMapping/>
@@ -15542,52 +16067,98 @@
           </a:bodyPr>
           <a:lstStyle/>
           <a:p>
-            <a:r>
-              <a:rPr lang="en-US" altLang="en-US" sz="3200" dirty="0"/>
-              <a:t>Results</a:t>
-            </a:r>
-          </a:p>
-          <a:p>
-            <a:pPr lvl="1"/>
-            <a:r>
-              <a:rPr lang="en-US" altLang="en-US" sz="2600" dirty="0"/>
-              <a:t>Include a flow chart of studies included</a:t>
-            </a:r>
-          </a:p>
-          <a:p>
-            <a:pPr lvl="1"/>
-            <a:r>
-              <a:rPr lang="en-US" altLang="en-US" sz="2600" dirty="0"/>
-              <a:t>Include a Table that lists all effect size estimates and key study variables</a:t>
-            </a:r>
-          </a:p>
-          <a:p>
-            <a:pPr lvl="1"/>
-            <a:r>
-              <a:rPr lang="en-US" altLang="en-US" sz="2600" dirty="0"/>
-              <a:t>A figure displaying the results from each individual study (forest plot), results of heterogeneity testing, overall summary statistic, and results of a sensitivity analysis and meta-regression, if performed.</a:t>
-            </a:r>
-          </a:p>
-          <a:p>
-            <a:pPr marL="457200" lvl="1" indent="0">
-              <a:buNone/>
+            <a:pPr>
+              <a:lnSpc>
+                <a:spcPct val="120000"/>
+              </a:lnSpc>
+              <a:spcBef>
+                <a:spcPts val="0"/>
+              </a:spcBef>
             </a:pPr>
             <a:r>
-              <a:rPr lang="en-US" altLang="en-US" sz="2600" dirty="0"/>
-              <a:t> </a:t>
-            </a:r>
-          </a:p>
-          <a:p>
-            <a:r>
-              <a:rPr lang="en-US" altLang="en-US" sz="3200" dirty="0"/>
-              <a:t>Discussion</a:t>
-            </a:r>
-          </a:p>
-          <a:p>
-            <a:pPr lvl="1"/>
-            <a:r>
-              <a:rPr lang="en-US" altLang="en-US" sz="2600" dirty="0"/>
-              <a:t>Explains how the findings advance an understanding of the topic</a:t>
+              <a:rPr lang="en-US" altLang="en-US" dirty="0"/>
+              <a:t>Somewhat different based on discipline, but ultimately, a typical manuscript describing a meta-analysis should include:</a:t>
+            </a:r>
+          </a:p>
+          <a:p>
+            <a:pPr lvl="1">
+              <a:lnSpc>
+                <a:spcPct val="120000"/>
+              </a:lnSpc>
+              <a:spcBef>
+                <a:spcPts val="0"/>
+              </a:spcBef>
+            </a:pPr>
+            <a:r>
+              <a:rPr lang="en-US" altLang="en-US" sz="2800" dirty="0"/>
+              <a:t>Introduction</a:t>
+            </a:r>
+          </a:p>
+          <a:p>
+            <a:pPr lvl="2">
+              <a:lnSpc>
+                <a:spcPct val="120000"/>
+              </a:lnSpc>
+              <a:spcBef>
+                <a:spcPts val="0"/>
+              </a:spcBef>
+            </a:pPr>
+            <a:r>
+              <a:rPr lang="en-US" altLang="en-US" sz="2200" dirty="0"/>
+              <a:t>Justifies why the review/meta-analysis was conducted</a:t>
+            </a:r>
+          </a:p>
+          <a:p>
+            <a:pPr lvl="2">
+              <a:lnSpc>
+                <a:spcPct val="120000"/>
+              </a:lnSpc>
+              <a:spcBef>
+                <a:spcPts val="0"/>
+              </a:spcBef>
+            </a:pPr>
+            <a:endParaRPr lang="en-US" altLang="en-US" sz="2200" dirty="0"/>
+          </a:p>
+          <a:p>
+            <a:pPr lvl="1">
+              <a:lnSpc>
+                <a:spcPct val="120000"/>
+              </a:lnSpc>
+              <a:spcBef>
+                <a:spcPts val="0"/>
+              </a:spcBef>
+            </a:pPr>
+            <a:r>
+              <a:rPr lang="en-US" altLang="en-US" sz="2800" dirty="0"/>
+              <a:t>Methods</a:t>
+            </a:r>
+          </a:p>
+          <a:p>
+            <a:pPr lvl="2">
+              <a:lnSpc>
+                <a:spcPct val="120000"/>
+              </a:lnSpc>
+              <a:spcBef>
+                <a:spcPts val="0"/>
+              </a:spcBef>
+            </a:pPr>
+            <a:r>
+              <a:rPr lang="en-US" altLang="en-US" sz="2200" dirty="0"/>
+              <a:t>Describe the literature search, specifically the databases used, and if the search was restricted in any way.</a:t>
+            </a:r>
+          </a:p>
+          <a:p>
+            <a:pPr lvl="2">
+              <a:lnSpc>
+                <a:spcPct val="120000"/>
+              </a:lnSpc>
+              <a:spcBef>
+                <a:spcPts val="0"/>
+              </a:spcBef>
+            </a:pPr>
+            <a:r>
+              <a:rPr lang="en-US" altLang="en-US" sz="2200" dirty="0"/>
+              <a:t>The selection process for articles, quality assessment, methods of data abstraction, and synthesis.</a:t>
             </a:r>
           </a:p>
         </p:txBody>
@@ -15597,7 +16168,7 @@
           <p:cNvPr id="2" name="Slide Number Placeholder 1">
             <a:extLst>
               <a:ext uri="{FF2B5EF4-FFF2-40B4-BE49-F238E27FC236}">
-                <a16:creationId xmlns:a16="http://schemas.microsoft.com/office/drawing/2014/main" id="{89EFDD8F-02CE-FF41-A01B-9DE6666AB587}"/>
+                <a16:creationId xmlns:a16="http://schemas.microsoft.com/office/drawing/2014/main" id="{0FAACA59-54A1-EE41-A618-F68DBDA59AF4}"/>
               </a:ext>
             </a:extLst>
           </p:cNvPr>
@@ -15622,11 +16193,6 @@
         </p:txBody>
       </p:sp>
     </p:spTree>
-    <p:extLst>
-      <p:ext uri="{BB962C8B-B14F-4D97-AF65-F5344CB8AC3E}">
-        <p14:creationId xmlns:p14="http://schemas.microsoft.com/office/powerpoint/2010/main" val="3108365171"/>
-      </p:ext>
-    </p:extLst>
   </p:cSld>
   <p:clrMapOvr>
     <a:masterClrMapping/>
@@ -15653,15 +16219,15 @@
       </p:grpSpPr>
       <p:sp>
         <p:nvSpPr>
-          <p:cNvPr id="2" name="Title 1">
-            <a:extLst>
-              <a:ext uri="{FF2B5EF4-FFF2-40B4-BE49-F238E27FC236}">
-                <a16:creationId xmlns:a16="http://schemas.microsoft.com/office/drawing/2014/main" id="{774AC840-F59E-1147-AD02-B4E369D86060}"/>
-              </a:ext>
-            </a:extLst>
-          </p:cNvPr>
-          <p:cNvSpPr>
-            <a:spLocks noGrp="1"/>
+          <p:cNvPr id="108546" name="Rectangle 2">
+            <a:extLst>
+              <a:ext uri="{FF2B5EF4-FFF2-40B4-BE49-F238E27FC236}">
+                <a16:creationId xmlns:a16="http://schemas.microsoft.com/office/drawing/2014/main" id="{D0636248-4CC9-7F4D-9503-4297A31F8082}"/>
+              </a:ext>
+            </a:extLst>
+          </p:cNvPr>
+          <p:cNvSpPr>
+            <a:spLocks noGrp="1" noChangeArrowheads="1"/>
           </p:cNvSpPr>
           <p:nvPr>
             <p:ph type="title"/>
@@ -15673,23 +16239,23 @@
           <a:lstStyle/>
           <a:p>
             <a:r>
-              <a:rPr lang="en-US" dirty="0"/>
-              <a:t>Strive for Openness</a:t>
-            </a:r>
-          </a:p>
-        </p:txBody>
-      </p:sp>
-      <p:sp>
-        <p:nvSpPr>
-          <p:cNvPr id="3" name="Content Placeholder 2">
-            <a:extLst>
-              <a:ext uri="{FF2B5EF4-FFF2-40B4-BE49-F238E27FC236}">
-                <a16:creationId xmlns:a16="http://schemas.microsoft.com/office/drawing/2014/main" id="{C9282D46-2F75-BA49-A08A-C3BEDB038B06}"/>
-              </a:ext>
-            </a:extLst>
-          </p:cNvPr>
-          <p:cNvSpPr>
-            <a:spLocks noGrp="1"/>
+              <a:rPr lang="en-US" altLang="en-US" dirty="0"/>
+              <a:t>Manuscript Preparation</a:t>
+            </a:r>
+          </a:p>
+        </p:txBody>
+      </p:sp>
+      <p:sp>
+        <p:nvSpPr>
+          <p:cNvPr id="108547" name="Rectangle 3">
+            <a:extLst>
+              <a:ext uri="{FF2B5EF4-FFF2-40B4-BE49-F238E27FC236}">
+                <a16:creationId xmlns:a16="http://schemas.microsoft.com/office/drawing/2014/main" id="{6CC9FA01-D8F1-EE49-82A0-D7419AA85913}"/>
+              </a:ext>
+            </a:extLst>
+          </p:cNvPr>
+          <p:cNvSpPr>
+            <a:spLocks noGrp="1" noChangeArrowheads="1"/>
           </p:cNvSpPr>
           <p:nvPr>
             <p:ph idx="1"/>
@@ -15697,34 +16263,67 @@
         </p:nvSpPr>
         <p:spPr/>
         <p:txBody>
-          <a:bodyPr/>
-          <a:lstStyle/>
-          <a:p>
-            <a:r>
-              <a:rPr lang="en-US" dirty="0"/>
-              <a:t>Consider making data and analysis script available via an online repository (e.g., Open Science Framework)</a:t>
-            </a:r>
-          </a:p>
-          <a:p>
-            <a:endParaRPr lang="en-US" dirty="0"/>
-          </a:p>
-          <a:p>
-            <a:r>
-              <a:rPr lang="en-US" dirty="0"/>
-              <a:t>Update any pre-registrations and note status and any major deviations from protocol</a:t>
-            </a:r>
-          </a:p>
-          <a:p>
-            <a:endParaRPr lang="en-US" dirty="0"/>
-          </a:p>
-        </p:txBody>
-      </p:sp>
-      <p:sp>
-        <p:nvSpPr>
-          <p:cNvPr id="4" name="Slide Number Placeholder 3">
-            <a:extLst>
-              <a:ext uri="{FF2B5EF4-FFF2-40B4-BE49-F238E27FC236}">
-                <a16:creationId xmlns:a16="http://schemas.microsoft.com/office/drawing/2014/main" id="{04CBB7FC-F07C-DC49-8EA5-A1F68AE12248}"/>
+          <a:bodyPr>
+            <a:noAutofit/>
+          </a:bodyPr>
+          <a:lstStyle/>
+          <a:p>
+            <a:r>
+              <a:rPr lang="en-US" altLang="en-US" sz="3200" dirty="0"/>
+              <a:t>Results</a:t>
+            </a:r>
+          </a:p>
+          <a:p>
+            <a:pPr lvl="1"/>
+            <a:r>
+              <a:rPr lang="en-US" altLang="en-US" sz="2600" dirty="0"/>
+              <a:t>Include a flow chart of studies included</a:t>
+            </a:r>
+          </a:p>
+          <a:p>
+            <a:pPr lvl="1"/>
+            <a:r>
+              <a:rPr lang="en-US" altLang="en-US" sz="2600" dirty="0"/>
+              <a:t>Include a Table that lists all effect size estimates and key study variables</a:t>
+            </a:r>
+          </a:p>
+          <a:p>
+            <a:pPr lvl="1"/>
+            <a:r>
+              <a:rPr lang="en-US" altLang="en-US" sz="2600" dirty="0"/>
+              <a:t>A figure displaying the results from each individual study (forest plot), results of heterogeneity testing, overall summary statistic, and results of a sensitivity analysis and meta-regression, if performed.</a:t>
+            </a:r>
+          </a:p>
+          <a:p>
+            <a:pPr marL="457200" lvl="1" indent="0">
+              <a:buNone/>
+            </a:pPr>
+            <a:r>
+              <a:rPr lang="en-US" altLang="en-US" sz="2600" dirty="0"/>
+              <a:t> </a:t>
+            </a:r>
+          </a:p>
+          <a:p>
+            <a:r>
+              <a:rPr lang="en-US" altLang="en-US" sz="3200" dirty="0"/>
+              <a:t>Discussion</a:t>
+            </a:r>
+          </a:p>
+          <a:p>
+            <a:pPr lvl="1"/>
+            <a:r>
+              <a:rPr lang="en-US" altLang="en-US" sz="2600" dirty="0"/>
+              <a:t>Explains how the findings advance an understanding of the topic</a:t>
+            </a:r>
+          </a:p>
+        </p:txBody>
+      </p:sp>
+      <p:sp>
+        <p:nvSpPr>
+          <p:cNvPr id="2" name="Slide Number Placeholder 1">
+            <a:extLst>
+              <a:ext uri="{FF2B5EF4-FFF2-40B4-BE49-F238E27FC236}">
+                <a16:creationId xmlns:a16="http://schemas.microsoft.com/office/drawing/2014/main" id="{89EFDD8F-02CE-FF41-A01B-9DE6666AB587}"/>
               </a:ext>
             </a:extLst>
           </p:cNvPr>
@@ -15751,7 +16350,7 @@
     </p:spTree>
     <p:extLst>
       <p:ext uri="{BB962C8B-B14F-4D97-AF65-F5344CB8AC3E}">
-        <p14:creationId xmlns:p14="http://schemas.microsoft.com/office/powerpoint/2010/main" val="3070779231"/>
+        <p14:creationId xmlns:p14="http://schemas.microsoft.com/office/powerpoint/2010/main" val="3108365171"/>
       </p:ext>
     </p:extLst>
   </p:cSld>
@@ -15801,7 +16400,7 @@
           <a:p>
             <a:r>
               <a:rPr lang="en-US" dirty="0"/>
-              <a:t>Additional Online Resources</a:t>
+              <a:t>Strive for Openness</a:t>
             </a:r>
           </a:p>
         </p:txBody>
@@ -15829,41 +16428,21 @@
           <a:p>
             <a:r>
               <a:rPr lang="en-US" dirty="0"/>
-              <a:t>Coursera: </a:t>
-            </a:r>
-            <a:r>
-              <a:rPr lang="en-US" dirty="0">
-                <a:hlinkClick r:id="rId2"/>
-              </a:rPr>
-              <a:t>https://www.coursera.org/learn/systematic-review</a:t>
-            </a:r>
+              <a:t>Consider making data and analysis script available via an online repository (e.g., Open Science Framework)</a:t>
+            </a:r>
+          </a:p>
+          <a:p>
+            <a:endParaRPr lang="en-US" dirty="0"/>
+          </a:p>
+          <a:p>
             <a:r>
               <a:rPr lang="en-US" dirty="0"/>
-              <a:t> </a:t>
+              <a:t>Update any pre-registrations and note status and any major deviations from protocol</a:t>
             </a:r>
           </a:p>
           <a:p>
             <a:endParaRPr lang="en-US" dirty="0"/>
           </a:p>
-          <a:p>
-            <a:r>
-              <a:rPr lang="en-US" dirty="0"/>
-              <a:t>Cochrane Learning: </a:t>
-            </a:r>
-            <a:r>
-              <a:rPr lang="en-US" dirty="0">
-                <a:hlinkClick r:id="rId3"/>
-              </a:rPr>
-              <a:t>https://training.cochrane.org/interactivelearning</a:t>
-            </a:r>
-            <a:r>
-              <a:rPr lang="en-US" dirty="0"/>
-              <a:t> </a:t>
-            </a:r>
-          </a:p>
-          <a:p>
-            <a:endParaRPr lang="en-US" dirty="0"/>
-          </a:p>
         </p:txBody>
       </p:sp>
       <p:sp>
@@ -15871,7 +16450,7 @@
           <p:cNvPr id="4" name="Slide Number Placeholder 3">
             <a:extLst>
               <a:ext uri="{FF2B5EF4-FFF2-40B4-BE49-F238E27FC236}">
-                <a16:creationId xmlns:a16="http://schemas.microsoft.com/office/drawing/2014/main" id="{FB7BEE0C-0517-3A48-86D4-A36D1CDA285D}"/>
+                <a16:creationId xmlns:a16="http://schemas.microsoft.com/office/drawing/2014/main" id="{04CBB7FC-F07C-DC49-8EA5-A1F68AE12248}"/>
               </a:ext>
             </a:extLst>
           </p:cNvPr>
@@ -15898,7 +16477,7 @@
     </p:spTree>
     <p:extLst>
       <p:ext uri="{BB962C8B-B14F-4D97-AF65-F5344CB8AC3E}">
-        <p14:creationId xmlns:p14="http://schemas.microsoft.com/office/powerpoint/2010/main" val="656725369"/>
+        <p14:creationId xmlns:p14="http://schemas.microsoft.com/office/powerpoint/2010/main" val="3070779231"/>
       </p:ext>
     </p:extLst>
   </p:cSld>
@@ -15930,7 +16509,7 @@
           <p:cNvPr id="2" name="Title 1">
             <a:extLst>
               <a:ext uri="{FF2B5EF4-FFF2-40B4-BE49-F238E27FC236}">
-                <a16:creationId xmlns:a16="http://schemas.microsoft.com/office/drawing/2014/main" id="{315BEDF6-8379-644B-9BF8-33C830931C71}"/>
+                <a16:creationId xmlns:a16="http://schemas.microsoft.com/office/drawing/2014/main" id="{774AC840-F59E-1147-AD02-B4E369D86060}"/>
               </a:ext>
             </a:extLst>
           </p:cNvPr>
@@ -15948,25 +16527,25 @@
           <a:p>
             <a:r>
               <a:rPr lang="en-US" dirty="0"/>
-              <a:t>Questions?</a:t>
-            </a:r>
-          </a:p>
-        </p:txBody>
-      </p:sp>
-      <p:sp>
-        <p:nvSpPr>
-          <p:cNvPr id="3" name="Text Placeholder 2">
-            <a:extLst>
-              <a:ext uri="{FF2B5EF4-FFF2-40B4-BE49-F238E27FC236}">
-                <a16:creationId xmlns:a16="http://schemas.microsoft.com/office/drawing/2014/main" id="{DD00EF4B-327F-2343-8146-57584E164DE8}"/>
-              </a:ext>
-            </a:extLst>
-          </p:cNvPr>
-          <p:cNvSpPr>
-            <a:spLocks noGrp="1"/>
-          </p:cNvSpPr>
-          <p:nvPr>
-            <p:ph type="body" idx="1"/>
+              <a:t>Additional Online Resources</a:t>
+            </a:r>
+          </a:p>
+        </p:txBody>
+      </p:sp>
+      <p:sp>
+        <p:nvSpPr>
+          <p:cNvPr id="3" name="Content Placeholder 2">
+            <a:extLst>
+              <a:ext uri="{FF2B5EF4-FFF2-40B4-BE49-F238E27FC236}">
+                <a16:creationId xmlns:a16="http://schemas.microsoft.com/office/drawing/2014/main" id="{C9282D46-2F75-BA49-A08A-C3BEDB038B06}"/>
+              </a:ext>
+            </a:extLst>
+          </p:cNvPr>
+          <p:cNvSpPr>
+            <a:spLocks noGrp="1"/>
+          </p:cNvSpPr>
+          <p:nvPr>
+            <p:ph idx="1"/>
           </p:nvPr>
         </p:nvSpPr>
         <p:spPr/>
@@ -15976,8 +16555,40 @@
           <a:p>
             <a:r>
               <a:rPr lang="en-US" dirty="0"/>
-              <a:t>We’ll pause here for questions about either Part 1 (Systematic review) or Part 2 (Meta-analysis)</a:t>
-            </a:r>
+              <a:t>Coursera: </a:t>
+            </a:r>
+            <a:r>
+              <a:rPr lang="en-US" dirty="0">
+                <a:hlinkClick r:id="rId2"/>
+              </a:rPr>
+              <a:t>https://www.coursera.org/learn/systematic-review</a:t>
+            </a:r>
+            <a:r>
+              <a:rPr lang="en-US" dirty="0"/>
+              <a:t> </a:t>
+            </a:r>
+          </a:p>
+          <a:p>
+            <a:endParaRPr lang="en-US" dirty="0"/>
+          </a:p>
+          <a:p>
+            <a:r>
+              <a:rPr lang="en-US" dirty="0"/>
+              <a:t>Cochrane Learning: </a:t>
+            </a:r>
+            <a:r>
+              <a:rPr lang="en-US" dirty="0">
+                <a:hlinkClick r:id="rId3"/>
+              </a:rPr>
+              <a:t>https://training.cochrane.org/interactivelearning</a:t>
+            </a:r>
+            <a:r>
+              <a:rPr lang="en-US" dirty="0"/>
+              <a:t> </a:t>
+            </a:r>
+          </a:p>
+          <a:p>
+            <a:endParaRPr lang="en-US" dirty="0"/>
           </a:p>
         </p:txBody>
       </p:sp>
@@ -15986,7 +16597,7 @@
           <p:cNvPr id="4" name="Slide Number Placeholder 3">
             <a:extLst>
               <a:ext uri="{FF2B5EF4-FFF2-40B4-BE49-F238E27FC236}">
-                <a16:creationId xmlns:a16="http://schemas.microsoft.com/office/drawing/2014/main" id="{EFC89E5D-00D5-8A46-AD43-8CA58A9E964F}"/>
+                <a16:creationId xmlns:a16="http://schemas.microsoft.com/office/drawing/2014/main" id="{FB7BEE0C-0517-3A48-86D4-A36D1CDA285D}"/>
               </a:ext>
             </a:extLst>
           </p:cNvPr>
@@ -16005,6 +16616,121 @@
             <a:fld id="{284273DD-104E-A841-819D-72454FA280E2}" type="slidenum">
               <a:rPr lang="en-US" smtClean="0"/>
               <a:t>47</a:t>
+            </a:fld>
+            <a:endParaRPr lang="en-US" dirty="0"/>
+          </a:p>
+        </p:txBody>
+      </p:sp>
+    </p:spTree>
+    <p:extLst>
+      <p:ext uri="{BB962C8B-B14F-4D97-AF65-F5344CB8AC3E}">
+        <p14:creationId xmlns:p14="http://schemas.microsoft.com/office/powerpoint/2010/main" val="656725369"/>
+      </p:ext>
+    </p:extLst>
+  </p:cSld>
+  <p:clrMapOvr>
+    <a:masterClrMapping/>
+  </p:clrMapOvr>
+</p:sld>
+</file>
+
+<file path=ppt/slides/slide49.xml><?xml version="1.0" encoding="utf-8"?>
+<p:sld xmlns:a="http://schemas.openxmlformats.org/drawingml/2006/main" xmlns:r="http://schemas.openxmlformats.org/officeDocument/2006/relationships" xmlns:p="http://schemas.openxmlformats.org/presentationml/2006/main">
+  <p:cSld>
+    <p:spTree>
+      <p:nvGrpSpPr>
+        <p:cNvPr id="1" name=""/>
+        <p:cNvGrpSpPr/>
+        <p:nvPr/>
+      </p:nvGrpSpPr>
+      <p:grpSpPr>
+        <a:xfrm>
+          <a:off x="0" y="0"/>
+          <a:ext cx="0" cy="0"/>
+          <a:chOff x="0" y="0"/>
+          <a:chExt cx="0" cy="0"/>
+        </a:xfrm>
+      </p:grpSpPr>
+      <p:sp>
+        <p:nvSpPr>
+          <p:cNvPr id="2" name="Title 1">
+            <a:extLst>
+              <a:ext uri="{FF2B5EF4-FFF2-40B4-BE49-F238E27FC236}">
+                <a16:creationId xmlns:a16="http://schemas.microsoft.com/office/drawing/2014/main" id="{315BEDF6-8379-644B-9BF8-33C830931C71}"/>
+              </a:ext>
+            </a:extLst>
+          </p:cNvPr>
+          <p:cNvSpPr>
+            <a:spLocks noGrp="1"/>
+          </p:cNvSpPr>
+          <p:nvPr>
+            <p:ph type="title"/>
+          </p:nvPr>
+        </p:nvSpPr>
+        <p:spPr/>
+        <p:txBody>
+          <a:bodyPr/>
+          <a:lstStyle/>
+          <a:p>
+            <a:r>
+              <a:rPr lang="en-US" dirty="0"/>
+              <a:t>Questions?</a:t>
+            </a:r>
+          </a:p>
+        </p:txBody>
+      </p:sp>
+      <p:sp>
+        <p:nvSpPr>
+          <p:cNvPr id="3" name="Text Placeholder 2">
+            <a:extLst>
+              <a:ext uri="{FF2B5EF4-FFF2-40B4-BE49-F238E27FC236}">
+                <a16:creationId xmlns:a16="http://schemas.microsoft.com/office/drawing/2014/main" id="{DD00EF4B-327F-2343-8146-57584E164DE8}"/>
+              </a:ext>
+            </a:extLst>
+          </p:cNvPr>
+          <p:cNvSpPr>
+            <a:spLocks noGrp="1"/>
+          </p:cNvSpPr>
+          <p:nvPr>
+            <p:ph type="body" idx="1"/>
+          </p:nvPr>
+        </p:nvSpPr>
+        <p:spPr/>
+        <p:txBody>
+          <a:bodyPr/>
+          <a:lstStyle/>
+          <a:p>
+            <a:r>
+              <a:rPr lang="en-US" dirty="0"/>
+              <a:t>We’ll pause here for questions about either Part 1 (Systematic review) or Part 2 (Meta-analysis)</a:t>
+            </a:r>
+          </a:p>
+        </p:txBody>
+      </p:sp>
+      <p:sp>
+        <p:nvSpPr>
+          <p:cNvPr id="4" name="Slide Number Placeholder 3">
+            <a:extLst>
+              <a:ext uri="{FF2B5EF4-FFF2-40B4-BE49-F238E27FC236}">
+                <a16:creationId xmlns:a16="http://schemas.microsoft.com/office/drawing/2014/main" id="{EFC89E5D-00D5-8A46-AD43-8CA58A9E964F}"/>
+              </a:ext>
+            </a:extLst>
+          </p:cNvPr>
+          <p:cNvSpPr>
+            <a:spLocks noGrp="1"/>
+          </p:cNvSpPr>
+          <p:nvPr>
+            <p:ph type="sldNum" sz="quarter" idx="12"/>
+          </p:nvPr>
+        </p:nvSpPr>
+        <p:spPr/>
+        <p:txBody>
+          <a:bodyPr/>
+          <a:lstStyle/>
+          <a:p>
+            <a:fld id="{284273DD-104E-A841-819D-72454FA280E2}" type="slidenum">
+              <a:rPr lang="en-US" smtClean="0"/>
+              <a:t>48</a:t>
             </a:fld>
             <a:endParaRPr lang="en-US" dirty="0"/>
           </a:p>

</xml_diff>